<commit_message>
Added comments and the diagrams
</commit_message>
<xml_diff>
--- a/SequenceUML.pptx
+++ b/SequenceUML.pptx
@@ -104,6 +104,11 @@
       </a:defRPr>
     </a:lvl9pPr>
   </p:defaultTextStyle>
+  <p:extLst>
+    <p:ext uri="{EFAFB233-063F-42B5-8137-9DF3F51BA10A}">
+      <p15:sldGuideLst xmlns:p15="http://schemas.microsoft.com/office/powerpoint/2012/main"/>
+    </p:ext>
+  </p:extLst>
 </p:presentation>
 </file>
 
@@ -238,7 +243,7 @@
           <a:p>
             <a:fld id="{576EEE98-EF27-456D-B464-3D96585A5221}" type="datetimeFigureOut">
               <a:rPr lang="en-GB" smtClean="0"/>
-              <a:t>27/02/2019</a:t>
+              <a:t>01/03/2019</a:t>
             </a:fld>
             <a:endParaRPr lang="en-GB"/>
           </a:p>
@@ -408,7 +413,7 @@
           <a:p>
             <a:fld id="{576EEE98-EF27-456D-B464-3D96585A5221}" type="datetimeFigureOut">
               <a:rPr lang="en-GB" smtClean="0"/>
-              <a:t>27/02/2019</a:t>
+              <a:t>01/03/2019</a:t>
             </a:fld>
             <a:endParaRPr lang="en-GB"/>
           </a:p>
@@ -588,7 +593,7 @@
           <a:p>
             <a:fld id="{576EEE98-EF27-456D-B464-3D96585A5221}" type="datetimeFigureOut">
               <a:rPr lang="en-GB" smtClean="0"/>
-              <a:t>27/02/2019</a:t>
+              <a:t>01/03/2019</a:t>
             </a:fld>
             <a:endParaRPr lang="en-GB"/>
           </a:p>
@@ -758,7 +763,7 @@
           <a:p>
             <a:fld id="{576EEE98-EF27-456D-B464-3D96585A5221}" type="datetimeFigureOut">
               <a:rPr lang="en-GB" smtClean="0"/>
-              <a:t>27/02/2019</a:t>
+              <a:t>01/03/2019</a:t>
             </a:fld>
             <a:endParaRPr lang="en-GB"/>
           </a:p>
@@ -1004,7 +1009,7 @@
           <a:p>
             <a:fld id="{576EEE98-EF27-456D-B464-3D96585A5221}" type="datetimeFigureOut">
               <a:rPr lang="en-GB" smtClean="0"/>
-              <a:t>27/02/2019</a:t>
+              <a:t>01/03/2019</a:t>
             </a:fld>
             <a:endParaRPr lang="en-GB"/>
           </a:p>
@@ -1236,7 +1241,7 @@
           <a:p>
             <a:fld id="{576EEE98-EF27-456D-B464-3D96585A5221}" type="datetimeFigureOut">
               <a:rPr lang="en-GB" smtClean="0"/>
-              <a:t>27/02/2019</a:t>
+              <a:t>01/03/2019</a:t>
             </a:fld>
             <a:endParaRPr lang="en-GB"/>
           </a:p>
@@ -1603,7 +1608,7 @@
           <a:p>
             <a:fld id="{576EEE98-EF27-456D-B464-3D96585A5221}" type="datetimeFigureOut">
               <a:rPr lang="en-GB" smtClean="0"/>
-              <a:t>27/02/2019</a:t>
+              <a:t>01/03/2019</a:t>
             </a:fld>
             <a:endParaRPr lang="en-GB"/>
           </a:p>
@@ -1721,7 +1726,7 @@
           <a:p>
             <a:fld id="{576EEE98-EF27-456D-B464-3D96585A5221}" type="datetimeFigureOut">
               <a:rPr lang="en-GB" smtClean="0"/>
-              <a:t>27/02/2019</a:t>
+              <a:t>01/03/2019</a:t>
             </a:fld>
             <a:endParaRPr lang="en-GB"/>
           </a:p>
@@ -1816,7 +1821,7 @@
           <a:p>
             <a:fld id="{576EEE98-EF27-456D-B464-3D96585A5221}" type="datetimeFigureOut">
               <a:rPr lang="en-GB" smtClean="0"/>
-              <a:t>27/02/2019</a:t>
+              <a:t>01/03/2019</a:t>
             </a:fld>
             <a:endParaRPr lang="en-GB"/>
           </a:p>
@@ -2093,7 +2098,7 @@
           <a:p>
             <a:fld id="{576EEE98-EF27-456D-B464-3D96585A5221}" type="datetimeFigureOut">
               <a:rPr lang="en-GB" smtClean="0"/>
-              <a:t>27/02/2019</a:t>
+              <a:t>01/03/2019</a:t>
             </a:fld>
             <a:endParaRPr lang="en-GB"/>
           </a:p>
@@ -2346,7 +2351,7 @@
           <a:p>
             <a:fld id="{576EEE98-EF27-456D-B464-3D96585A5221}" type="datetimeFigureOut">
               <a:rPr lang="en-GB" smtClean="0"/>
-              <a:t>27/02/2019</a:t>
+              <a:t>01/03/2019</a:t>
             </a:fld>
             <a:endParaRPr lang="en-GB"/>
           </a:p>
@@ -2559,7 +2564,7 @@
           <a:p>
             <a:fld id="{576EEE98-EF27-456D-B464-3D96585A5221}" type="datetimeFigureOut">
               <a:rPr lang="en-GB" smtClean="0"/>
-              <a:t>27/02/2019</a:t>
+              <a:t>01/03/2019</a:t>
             </a:fld>
             <a:endParaRPr lang="en-GB"/>
           </a:p>
@@ -2972,12 +2977,18 @@
         </p:nvSpPr>
         <p:spPr>
           <a:xfrm>
-            <a:off x="191194" y="606828"/>
-            <a:ext cx="3358341" cy="5852161"/>
+            <a:off x="307574" y="1113903"/>
+            <a:ext cx="3749039" cy="5245333"/>
           </a:xfrm>
           <a:prstGeom prst="rect">
             <a:avLst/>
           </a:prstGeom>
+          <a:solidFill>
+            <a:schemeClr val="accent1">
+              <a:lumMod val="60000"/>
+              <a:lumOff val="40000"/>
+            </a:schemeClr>
+          </a:solidFill>
         </p:spPr>
         <p:style>
           <a:lnRef idx="2">
@@ -3004,1686 +3015,18 @@
           </a:p>
         </p:txBody>
       </p:sp>
-      <p:sp>
-        <p:nvSpPr>
-          <p:cNvPr id="5" name="TextBox 4"/>
-          <p:cNvSpPr txBox="1"/>
-          <p:nvPr/>
-        </p:nvSpPr>
-        <p:spPr>
-          <a:xfrm>
-            <a:off x="1320684" y="641534"/>
-            <a:ext cx="2190404" cy="523220"/>
-          </a:xfrm>
-          <a:prstGeom prst="rect">
-            <a:avLst/>
-          </a:prstGeom>
-          <a:noFill/>
-        </p:spPr>
-        <p:txBody>
-          <a:bodyPr wrap="square" rtlCol="0">
-            <a:spAutoFit/>
-          </a:bodyPr>
-          <a:lstStyle/>
-          <a:p>
-            <a:r>
-              <a:rPr lang="en-GB" sz="2800" dirty="0" smtClean="0"/>
-              <a:t>Client</a:t>
-            </a:r>
-            <a:endParaRPr lang="en-GB" sz="2800" dirty="0"/>
-          </a:p>
-        </p:txBody>
-      </p:sp>
-      <p:sp>
-        <p:nvSpPr>
-          <p:cNvPr id="6" name="Rectangle 5"/>
-          <p:cNvSpPr/>
-          <p:nvPr/>
-        </p:nvSpPr>
-        <p:spPr>
-          <a:xfrm>
-            <a:off x="4422372" y="581891"/>
-            <a:ext cx="7215448" cy="5685905"/>
-          </a:xfrm>
-          <a:prstGeom prst="rect">
-            <a:avLst/>
-          </a:prstGeom>
-        </p:spPr>
-        <p:style>
-          <a:lnRef idx="2">
-            <a:schemeClr val="accent1">
-              <a:shade val="50000"/>
-            </a:schemeClr>
-          </a:lnRef>
-          <a:fillRef idx="1">
-            <a:schemeClr val="accent1"/>
-          </a:fillRef>
-          <a:effectRef idx="0">
-            <a:schemeClr val="accent1"/>
-          </a:effectRef>
-          <a:fontRef idx="minor">
-            <a:schemeClr val="lt1"/>
-          </a:fontRef>
-        </p:style>
-        <p:txBody>
-          <a:bodyPr rtlCol="0" anchor="ctr"/>
-          <a:lstStyle/>
-          <a:p>
-            <a:pPr algn="ctr"/>
-            <a:endParaRPr lang="en-GB"/>
-          </a:p>
-        </p:txBody>
-      </p:sp>
-      <p:sp>
-        <p:nvSpPr>
-          <p:cNvPr id="7" name="TextBox 6"/>
-          <p:cNvSpPr txBox="1"/>
-          <p:nvPr/>
-        </p:nvSpPr>
-        <p:spPr>
-          <a:xfrm>
-            <a:off x="7506392" y="606828"/>
-            <a:ext cx="1729047" cy="523220"/>
-          </a:xfrm>
-          <a:prstGeom prst="rect">
-            <a:avLst/>
-          </a:prstGeom>
-          <a:noFill/>
-        </p:spPr>
-        <p:txBody>
-          <a:bodyPr wrap="square" rtlCol="0">
-            <a:spAutoFit/>
-          </a:bodyPr>
-          <a:lstStyle/>
-          <a:p>
-            <a:r>
-              <a:rPr lang="en-GB" sz="2800" dirty="0" smtClean="0"/>
-              <a:t>Server</a:t>
-            </a:r>
-            <a:endParaRPr lang="en-GB" sz="2800" dirty="0"/>
-          </a:p>
-        </p:txBody>
-      </p:sp>
-      <p:sp>
-        <p:nvSpPr>
-          <p:cNvPr id="8" name="TextBox 7"/>
-          <p:cNvSpPr txBox="1"/>
-          <p:nvPr/>
-        </p:nvSpPr>
-        <p:spPr>
-          <a:xfrm>
-            <a:off x="4732020" y="1066433"/>
-            <a:ext cx="1413164" cy="369332"/>
-          </a:xfrm>
-          <a:prstGeom prst="rect">
-            <a:avLst/>
-          </a:prstGeom>
-          <a:noFill/>
-        </p:spPr>
-        <p:txBody>
-          <a:bodyPr wrap="square" rtlCol="0">
-            <a:spAutoFit/>
-          </a:bodyPr>
-          <a:lstStyle/>
-          <a:p>
-            <a:r>
-              <a:rPr lang="en-GB" u="sng" dirty="0" err="1" smtClean="0"/>
-              <a:t>Recv</a:t>
-            </a:r>
-            <a:r>
-              <a:rPr lang="en-GB" u="sng" dirty="0" smtClean="0"/>
-              <a:t> Thread</a:t>
-            </a:r>
-            <a:endParaRPr lang="en-GB" u="sng" dirty="0"/>
-          </a:p>
-        </p:txBody>
-      </p:sp>
-      <p:sp>
-        <p:nvSpPr>
-          <p:cNvPr id="9" name="TextBox 8"/>
-          <p:cNvSpPr txBox="1"/>
-          <p:nvPr/>
-        </p:nvSpPr>
-        <p:spPr>
-          <a:xfrm>
-            <a:off x="6294812" y="1074746"/>
-            <a:ext cx="1413164" cy="369332"/>
-          </a:xfrm>
-          <a:prstGeom prst="rect">
-            <a:avLst/>
-          </a:prstGeom>
-          <a:noFill/>
-        </p:spPr>
-        <p:txBody>
-          <a:bodyPr wrap="square" rtlCol="0">
-            <a:spAutoFit/>
-          </a:bodyPr>
-          <a:lstStyle/>
-          <a:p>
-            <a:r>
-              <a:rPr lang="en-GB" u="sng" dirty="0" smtClean="0"/>
-              <a:t>Send Thread</a:t>
-            </a:r>
-            <a:endParaRPr lang="en-GB" u="sng" dirty="0"/>
-          </a:p>
-        </p:txBody>
-      </p:sp>
-      <p:sp>
-        <p:nvSpPr>
-          <p:cNvPr id="10" name="TextBox 9"/>
-          <p:cNvSpPr txBox="1"/>
-          <p:nvPr/>
-        </p:nvSpPr>
-        <p:spPr>
-          <a:xfrm>
-            <a:off x="8055032" y="1066433"/>
-            <a:ext cx="1554482" cy="369332"/>
-          </a:xfrm>
-          <a:prstGeom prst="rect">
-            <a:avLst/>
-          </a:prstGeom>
-          <a:noFill/>
-        </p:spPr>
-        <p:txBody>
-          <a:bodyPr wrap="square" rtlCol="0">
-            <a:spAutoFit/>
-          </a:bodyPr>
-          <a:lstStyle/>
-          <a:p>
-            <a:r>
-              <a:rPr lang="en-GB" u="sng" dirty="0" smtClean="0"/>
-              <a:t>Accept Thread</a:t>
-            </a:r>
-            <a:endParaRPr lang="en-GB" u="sng" dirty="0"/>
-          </a:p>
-        </p:txBody>
-      </p:sp>
-      <p:sp>
-        <p:nvSpPr>
-          <p:cNvPr id="11" name="TextBox 10"/>
-          <p:cNvSpPr txBox="1"/>
-          <p:nvPr/>
-        </p:nvSpPr>
-        <p:spPr>
-          <a:xfrm>
-            <a:off x="9792392" y="1066434"/>
-            <a:ext cx="1554482" cy="369332"/>
-          </a:xfrm>
-          <a:prstGeom prst="rect">
-            <a:avLst/>
-          </a:prstGeom>
-          <a:noFill/>
-        </p:spPr>
-        <p:txBody>
-          <a:bodyPr wrap="square" rtlCol="0">
-            <a:spAutoFit/>
-          </a:bodyPr>
-          <a:lstStyle/>
-          <a:p>
-            <a:r>
-              <a:rPr lang="en-GB" u="sng" dirty="0" smtClean="0"/>
-              <a:t>Game Thread</a:t>
-            </a:r>
-            <a:endParaRPr lang="en-GB" u="sng" dirty="0"/>
-          </a:p>
-        </p:txBody>
-      </p:sp>
       <p:cxnSp>
         <p:nvCxnSpPr>
-          <p:cNvPr id="18" name="Straight Arrow Connector 17"/>
-          <p:cNvCxnSpPr/>
-          <p:nvPr/>
-        </p:nvCxnSpPr>
-        <p:spPr>
-          <a:xfrm>
-            <a:off x="3218066" y="1720939"/>
-            <a:ext cx="4920095" cy="82159"/>
-          </a:xfrm>
-          <a:prstGeom prst="straightConnector1">
-            <a:avLst/>
-          </a:prstGeom>
-          <a:ln w="38100">
-            <a:solidFill>
-              <a:schemeClr val="tx1"/>
-            </a:solidFill>
-            <a:tailEnd type="triangle"/>
-          </a:ln>
-        </p:spPr>
-        <p:style>
-          <a:lnRef idx="1">
-            <a:schemeClr val="accent1"/>
-          </a:lnRef>
-          <a:fillRef idx="0">
-            <a:schemeClr val="accent1"/>
-          </a:fillRef>
-          <a:effectRef idx="0">
-            <a:schemeClr val="accent1"/>
-          </a:effectRef>
-          <a:fontRef idx="minor">
-            <a:schemeClr val="tx1"/>
-          </a:fontRef>
-        </p:style>
-      </p:cxnSp>
-      <p:sp>
-        <p:nvSpPr>
-          <p:cNvPr id="20" name="Rectangle 19"/>
-          <p:cNvSpPr/>
-          <p:nvPr/>
-        </p:nvSpPr>
-        <p:spPr>
-          <a:xfrm>
-            <a:off x="1939993" y="1859089"/>
-            <a:ext cx="1354975" cy="567604"/>
-          </a:xfrm>
-          <a:prstGeom prst="rect">
-            <a:avLst/>
-          </a:prstGeom>
-          <a:solidFill>
-            <a:schemeClr val="accent1">
-              <a:lumMod val="50000"/>
-            </a:schemeClr>
-          </a:solidFill>
-          <a:ln>
-            <a:solidFill>
-              <a:schemeClr val="bg1"/>
-            </a:solidFill>
-          </a:ln>
-        </p:spPr>
-        <p:style>
-          <a:lnRef idx="2">
-            <a:schemeClr val="accent1">
-              <a:shade val="50000"/>
-            </a:schemeClr>
-          </a:lnRef>
-          <a:fillRef idx="1">
-            <a:schemeClr val="accent1"/>
-          </a:fillRef>
-          <a:effectRef idx="0">
-            <a:schemeClr val="accent1"/>
-          </a:effectRef>
-          <a:fontRef idx="minor">
-            <a:schemeClr val="lt1"/>
-          </a:fontRef>
-        </p:style>
-        <p:txBody>
-          <a:bodyPr rtlCol="0" anchor="ctr"/>
-          <a:lstStyle/>
-          <a:p>
-            <a:pPr algn="ctr"/>
-            <a:r>
-              <a:rPr lang="en-GB" dirty="0" smtClean="0"/>
-              <a:t>Connect to server</a:t>
-            </a:r>
-            <a:endParaRPr lang="en-GB" dirty="0"/>
-          </a:p>
-        </p:txBody>
-      </p:sp>
-      <p:sp>
-        <p:nvSpPr>
-          <p:cNvPr id="25" name="Rectangle 24"/>
-          <p:cNvSpPr/>
-          <p:nvPr/>
-        </p:nvSpPr>
-        <p:spPr>
-          <a:xfrm>
-            <a:off x="1937912" y="2527808"/>
-            <a:ext cx="1354975" cy="2102617"/>
-          </a:xfrm>
-          <a:prstGeom prst="rect">
-            <a:avLst/>
-          </a:prstGeom>
-          <a:solidFill>
-            <a:schemeClr val="accent1">
-              <a:lumMod val="50000"/>
-            </a:schemeClr>
-          </a:solidFill>
-          <a:ln>
-            <a:solidFill>
-              <a:schemeClr val="bg1"/>
-            </a:solidFill>
-          </a:ln>
-        </p:spPr>
-        <p:style>
-          <a:lnRef idx="2">
-            <a:schemeClr val="accent1">
-              <a:shade val="50000"/>
-            </a:schemeClr>
-          </a:lnRef>
-          <a:fillRef idx="1">
-            <a:schemeClr val="accent1"/>
-          </a:fillRef>
-          <a:effectRef idx="0">
-            <a:schemeClr val="accent1"/>
-          </a:effectRef>
-          <a:fontRef idx="minor">
-            <a:schemeClr val="lt1"/>
-          </a:fontRef>
-        </p:style>
-        <p:txBody>
-          <a:bodyPr rtlCol="0" anchor="t"/>
-          <a:lstStyle/>
-          <a:p>
-            <a:pPr algn="ctr"/>
-            <a:r>
-              <a:rPr lang="en-GB" dirty="0" smtClean="0"/>
-              <a:t>Connected</a:t>
-            </a:r>
-            <a:endParaRPr lang="en-GB" dirty="0"/>
-          </a:p>
-        </p:txBody>
-      </p:sp>
-      <p:sp>
-        <p:nvSpPr>
-          <p:cNvPr id="23" name="Rectangle 22"/>
-          <p:cNvSpPr/>
-          <p:nvPr/>
-        </p:nvSpPr>
-        <p:spPr>
-          <a:xfrm>
-            <a:off x="2164435" y="2987591"/>
-            <a:ext cx="1354975" cy="567604"/>
-          </a:xfrm>
-          <a:prstGeom prst="rect">
-            <a:avLst/>
-          </a:prstGeom>
-          <a:solidFill>
-            <a:schemeClr val="accent1">
-              <a:lumMod val="50000"/>
-            </a:schemeClr>
-          </a:solidFill>
-          <a:ln>
-            <a:solidFill>
-              <a:schemeClr val="bg1"/>
-            </a:solidFill>
-          </a:ln>
-        </p:spPr>
-        <p:style>
-          <a:lnRef idx="2">
-            <a:schemeClr val="accent1">
-              <a:shade val="50000"/>
-            </a:schemeClr>
-          </a:lnRef>
-          <a:fillRef idx="1">
-            <a:schemeClr val="accent1"/>
-          </a:fillRef>
-          <a:effectRef idx="0">
-            <a:schemeClr val="accent1"/>
-          </a:effectRef>
-          <a:fontRef idx="minor">
-            <a:schemeClr val="lt1"/>
-          </a:fontRef>
-        </p:style>
-        <p:txBody>
-          <a:bodyPr rtlCol="0" anchor="ctr"/>
-          <a:lstStyle/>
-          <a:p>
-            <a:pPr algn="ctr"/>
-            <a:r>
-              <a:rPr lang="en-GB" dirty="0" smtClean="0"/>
-              <a:t>Send inputs</a:t>
-            </a:r>
-            <a:endParaRPr lang="en-GB" dirty="0"/>
-          </a:p>
-        </p:txBody>
-      </p:sp>
-      <p:sp>
-        <p:nvSpPr>
-          <p:cNvPr id="24" name="Rectangle 23"/>
-          <p:cNvSpPr/>
-          <p:nvPr/>
-        </p:nvSpPr>
-        <p:spPr>
-          <a:xfrm>
-            <a:off x="2164435" y="3704142"/>
-            <a:ext cx="1354975" cy="567604"/>
-          </a:xfrm>
-          <a:prstGeom prst="rect">
-            <a:avLst/>
-          </a:prstGeom>
-          <a:solidFill>
-            <a:schemeClr val="accent1">
-              <a:lumMod val="50000"/>
-            </a:schemeClr>
-          </a:solidFill>
-          <a:ln>
-            <a:solidFill>
-              <a:schemeClr val="bg1"/>
-            </a:solidFill>
-          </a:ln>
-        </p:spPr>
-        <p:style>
-          <a:lnRef idx="2">
-            <a:schemeClr val="accent1">
-              <a:shade val="50000"/>
-            </a:schemeClr>
-          </a:lnRef>
-          <a:fillRef idx="1">
-            <a:schemeClr val="accent1"/>
-          </a:fillRef>
-          <a:effectRef idx="0">
-            <a:schemeClr val="accent1"/>
-          </a:effectRef>
-          <a:fontRef idx="minor">
-            <a:schemeClr val="lt1"/>
-          </a:fontRef>
-        </p:style>
-        <p:txBody>
-          <a:bodyPr rtlCol="0" anchor="ctr"/>
-          <a:lstStyle/>
-          <a:p>
-            <a:pPr algn="ctr"/>
-            <a:r>
-              <a:rPr lang="en-GB" dirty="0" smtClean="0"/>
-              <a:t>Receive outputs</a:t>
-            </a:r>
-            <a:endParaRPr lang="en-GB" dirty="0"/>
-          </a:p>
-        </p:txBody>
-      </p:sp>
-      <p:sp>
-        <p:nvSpPr>
-          <p:cNvPr id="27" name="Rectangle 26"/>
-          <p:cNvSpPr/>
-          <p:nvPr/>
-        </p:nvSpPr>
-        <p:spPr>
-          <a:xfrm>
-            <a:off x="8138161" y="1435764"/>
-            <a:ext cx="1354975" cy="800359"/>
-          </a:xfrm>
-          <a:prstGeom prst="rect">
-            <a:avLst/>
-          </a:prstGeom>
-          <a:solidFill>
-            <a:schemeClr val="accent1">
-              <a:lumMod val="50000"/>
-            </a:schemeClr>
-          </a:solidFill>
-          <a:ln>
-            <a:solidFill>
-              <a:schemeClr val="bg1"/>
-            </a:solidFill>
-          </a:ln>
-        </p:spPr>
-        <p:style>
-          <a:lnRef idx="2">
-            <a:schemeClr val="accent1">
-              <a:shade val="50000"/>
-            </a:schemeClr>
-          </a:lnRef>
-          <a:fillRef idx="1">
-            <a:schemeClr val="accent1"/>
-          </a:fillRef>
-          <a:effectRef idx="0">
-            <a:schemeClr val="accent1"/>
-          </a:effectRef>
-          <a:fontRef idx="minor">
-            <a:schemeClr val="lt1"/>
-          </a:fontRef>
-        </p:style>
-        <p:txBody>
-          <a:bodyPr rtlCol="0" anchor="ctr"/>
-          <a:lstStyle/>
-          <a:p>
-            <a:pPr algn="ctr"/>
-            <a:r>
-              <a:rPr lang="en-GB" dirty="0" smtClean="0"/>
-              <a:t>Create player and threads</a:t>
-            </a:r>
-            <a:endParaRPr lang="en-GB" dirty="0"/>
-          </a:p>
-        </p:txBody>
-      </p:sp>
-      <p:sp>
-        <p:nvSpPr>
-          <p:cNvPr id="28" name="Rectangle 27"/>
-          <p:cNvSpPr/>
-          <p:nvPr/>
-        </p:nvSpPr>
-        <p:spPr>
-          <a:xfrm>
-            <a:off x="9818368" y="1444078"/>
-            <a:ext cx="1354975" cy="4183638"/>
-          </a:xfrm>
-          <a:prstGeom prst="rect">
-            <a:avLst/>
-          </a:prstGeom>
-          <a:solidFill>
-            <a:schemeClr val="accent1">
-              <a:lumMod val="50000"/>
-            </a:schemeClr>
-          </a:solidFill>
-          <a:ln>
-            <a:solidFill>
-              <a:schemeClr val="bg1"/>
-            </a:solidFill>
-          </a:ln>
-        </p:spPr>
-        <p:style>
-          <a:lnRef idx="2">
-            <a:schemeClr val="accent1">
-              <a:shade val="50000"/>
-            </a:schemeClr>
-          </a:lnRef>
-          <a:fillRef idx="1">
-            <a:schemeClr val="accent1"/>
-          </a:fillRef>
-          <a:effectRef idx="0">
-            <a:schemeClr val="accent1"/>
-          </a:effectRef>
-          <a:fontRef idx="minor">
-            <a:schemeClr val="lt1"/>
-          </a:fontRef>
-        </p:style>
-        <p:txBody>
-          <a:bodyPr rtlCol="0" anchor="ctr"/>
-          <a:lstStyle/>
-          <a:p>
-            <a:pPr algn="ctr"/>
-            <a:r>
-              <a:rPr lang="en-GB" dirty="0" smtClean="0"/>
-              <a:t>Game loop</a:t>
-            </a:r>
-            <a:endParaRPr lang="en-GB" dirty="0"/>
-          </a:p>
-        </p:txBody>
-      </p:sp>
-      <p:cxnSp>
-        <p:nvCxnSpPr>
-          <p:cNvPr id="29" name="Straight Arrow Connector 28"/>
+          <p:cNvPr id="76" name="Straight Connector 75"/>
           <p:cNvCxnSpPr>
-            <a:stCxn id="23" idx="3"/>
+            <a:stCxn id="71" idx="2"/>
           </p:cNvCxnSpPr>
           <p:nvPr/>
         </p:nvCxnSpPr>
         <p:spPr>
-          <a:xfrm>
-            <a:off x="3519410" y="3271393"/>
-            <a:ext cx="1236524" cy="0"/>
-          </a:xfrm>
-          <a:prstGeom prst="straightConnector1">
-            <a:avLst/>
-          </a:prstGeom>
-          <a:ln w="38100">
-            <a:solidFill>
-              <a:schemeClr val="tx1"/>
-            </a:solidFill>
-            <a:tailEnd type="triangle"/>
-          </a:ln>
-        </p:spPr>
-        <p:style>
-          <a:lnRef idx="1">
-            <a:schemeClr val="accent1"/>
-          </a:lnRef>
-          <a:fillRef idx="0">
-            <a:schemeClr val="accent1"/>
-          </a:fillRef>
-          <a:effectRef idx="0">
-            <a:schemeClr val="accent1"/>
-          </a:effectRef>
-          <a:fontRef idx="minor">
-            <a:schemeClr val="tx1"/>
-          </a:fontRef>
-        </p:style>
-      </p:cxnSp>
-      <p:sp>
-        <p:nvSpPr>
-          <p:cNvPr id="32" name="Rectangle 31"/>
-          <p:cNvSpPr/>
-          <p:nvPr/>
-        </p:nvSpPr>
-        <p:spPr>
-          <a:xfrm>
-            <a:off x="4692540" y="1899379"/>
-            <a:ext cx="1403809" cy="1612538"/>
-          </a:xfrm>
-          <a:prstGeom prst="rect">
-            <a:avLst/>
-          </a:prstGeom>
-          <a:solidFill>
-            <a:schemeClr val="accent1">
-              <a:lumMod val="50000"/>
-            </a:schemeClr>
-          </a:solidFill>
-          <a:ln>
-            <a:solidFill>
-              <a:schemeClr val="bg1"/>
-            </a:solidFill>
-          </a:ln>
-        </p:spPr>
-        <p:style>
-          <a:lnRef idx="2">
-            <a:schemeClr val="accent1">
-              <a:shade val="50000"/>
-            </a:schemeClr>
-          </a:lnRef>
-          <a:fillRef idx="1">
-            <a:schemeClr val="accent1"/>
-          </a:fillRef>
-          <a:effectRef idx="0">
-            <a:schemeClr val="accent1"/>
-          </a:effectRef>
-          <a:fontRef idx="minor">
-            <a:schemeClr val="lt1"/>
-          </a:fontRef>
-        </p:style>
-        <p:txBody>
-          <a:bodyPr rtlCol="0" anchor="ctr"/>
-          <a:lstStyle/>
-          <a:p>
-            <a:pPr algn="ctr"/>
-            <a:r>
-              <a:rPr lang="en-GB" dirty="0" smtClean="0"/>
-              <a:t>Receive player inputs</a:t>
-            </a:r>
-            <a:endParaRPr lang="en-GB" dirty="0"/>
-          </a:p>
-        </p:txBody>
-      </p:sp>
-      <p:cxnSp>
-        <p:nvCxnSpPr>
-          <p:cNvPr id="33" name="Straight Arrow Connector 32"/>
-          <p:cNvCxnSpPr/>
-          <p:nvPr/>
-        </p:nvCxnSpPr>
-        <p:spPr>
-          <a:xfrm>
-            <a:off x="6096349" y="2419577"/>
-            <a:ext cx="3610319" cy="19133"/>
-          </a:xfrm>
-          <a:prstGeom prst="straightConnector1">
-            <a:avLst/>
-          </a:prstGeom>
-          <a:ln w="38100">
-            <a:solidFill>
-              <a:schemeClr val="tx1"/>
-            </a:solidFill>
-            <a:tailEnd type="triangle"/>
-          </a:ln>
-        </p:spPr>
-        <p:style>
-          <a:lnRef idx="1">
-            <a:schemeClr val="accent1"/>
-          </a:lnRef>
-          <a:fillRef idx="0">
-            <a:schemeClr val="accent1"/>
-          </a:fillRef>
-          <a:effectRef idx="0">
-            <a:schemeClr val="accent1"/>
-          </a:effectRef>
-          <a:fontRef idx="minor">
-            <a:schemeClr val="tx1"/>
-          </a:fontRef>
-        </p:style>
-      </p:cxnSp>
-      <p:sp>
-        <p:nvSpPr>
-          <p:cNvPr id="35" name="Rectangle 34"/>
-          <p:cNvSpPr/>
-          <p:nvPr/>
-        </p:nvSpPr>
-        <p:spPr>
-          <a:xfrm>
-            <a:off x="6294812" y="2709739"/>
-            <a:ext cx="1413164" cy="1604357"/>
-          </a:xfrm>
-          <a:prstGeom prst="rect">
-            <a:avLst/>
-          </a:prstGeom>
-          <a:solidFill>
-            <a:schemeClr val="accent1">
-              <a:lumMod val="50000"/>
-            </a:schemeClr>
-          </a:solidFill>
-          <a:ln>
-            <a:solidFill>
-              <a:schemeClr val="bg1"/>
-            </a:solidFill>
-          </a:ln>
-        </p:spPr>
-        <p:style>
-          <a:lnRef idx="2">
-            <a:schemeClr val="accent1">
-              <a:shade val="50000"/>
-            </a:schemeClr>
-          </a:lnRef>
-          <a:fillRef idx="1">
-            <a:schemeClr val="accent1"/>
-          </a:fillRef>
-          <a:effectRef idx="0">
-            <a:schemeClr val="accent1"/>
-          </a:effectRef>
-          <a:fontRef idx="minor">
-            <a:schemeClr val="lt1"/>
-          </a:fontRef>
-        </p:style>
-        <p:txBody>
-          <a:bodyPr rtlCol="0" anchor="ctr"/>
-          <a:lstStyle/>
-          <a:p>
-            <a:pPr algn="ctr"/>
-            <a:r>
-              <a:rPr lang="en-GB" dirty="0" smtClean="0"/>
-              <a:t>Send player outputs</a:t>
-            </a:r>
-            <a:endParaRPr lang="en-GB" dirty="0"/>
-          </a:p>
-        </p:txBody>
-      </p:sp>
-      <p:sp>
-        <p:nvSpPr>
-          <p:cNvPr id="41" name="Rectangle 40"/>
-          <p:cNvSpPr/>
-          <p:nvPr/>
-        </p:nvSpPr>
-        <p:spPr>
-          <a:xfrm>
-            <a:off x="1889066" y="4870971"/>
-            <a:ext cx="1465119" cy="449157"/>
-          </a:xfrm>
-          <a:prstGeom prst="rect">
-            <a:avLst/>
-          </a:prstGeom>
-          <a:solidFill>
-            <a:schemeClr val="accent1">
-              <a:lumMod val="50000"/>
-            </a:schemeClr>
-          </a:solidFill>
-          <a:ln>
-            <a:solidFill>
-              <a:schemeClr val="bg1"/>
-            </a:solidFill>
-          </a:ln>
-        </p:spPr>
-        <p:style>
-          <a:lnRef idx="2">
-            <a:schemeClr val="accent1">
-              <a:shade val="50000"/>
-            </a:schemeClr>
-          </a:lnRef>
-          <a:fillRef idx="1">
-            <a:schemeClr val="accent1"/>
-          </a:fillRef>
-          <a:effectRef idx="0">
-            <a:schemeClr val="accent1"/>
-          </a:effectRef>
-          <a:fontRef idx="minor">
-            <a:schemeClr val="lt1"/>
-          </a:fontRef>
-        </p:style>
-        <p:txBody>
-          <a:bodyPr rtlCol="0" anchor="t"/>
-          <a:lstStyle/>
-          <a:p>
-            <a:pPr algn="ctr"/>
-            <a:r>
-              <a:rPr lang="en-GB" dirty="0" smtClean="0"/>
-              <a:t>Disconnected</a:t>
-            </a:r>
-            <a:endParaRPr lang="en-GB" dirty="0"/>
-          </a:p>
-        </p:txBody>
-      </p:sp>
-      <p:cxnSp>
-        <p:nvCxnSpPr>
-          <p:cNvPr id="43" name="Straight Arrow Connector 42"/>
-          <p:cNvCxnSpPr/>
-          <p:nvPr/>
-        </p:nvCxnSpPr>
-        <p:spPr>
           <a:xfrm flipH="1">
-            <a:off x="7902289" y="4077183"/>
-            <a:ext cx="1804378" cy="0"/>
-          </a:xfrm>
-          <a:prstGeom prst="straightConnector1">
-            <a:avLst/>
-          </a:prstGeom>
-          <a:ln w="38100">
-            <a:solidFill>
-              <a:schemeClr val="tx1"/>
-            </a:solidFill>
-            <a:tailEnd type="triangle"/>
-          </a:ln>
-        </p:spPr>
-        <p:style>
-          <a:lnRef idx="1">
-            <a:schemeClr val="accent1"/>
-          </a:lnRef>
-          <a:fillRef idx="0">
-            <a:schemeClr val="accent1"/>
-          </a:fillRef>
-          <a:effectRef idx="0">
-            <a:schemeClr val="accent1"/>
-          </a:effectRef>
-          <a:fontRef idx="minor">
-            <a:schemeClr val="tx1"/>
-          </a:fontRef>
-        </p:style>
-      </p:cxnSp>
-      <p:sp>
-        <p:nvSpPr>
-          <p:cNvPr id="46" name="Rectangle 45"/>
-          <p:cNvSpPr/>
-          <p:nvPr/>
-        </p:nvSpPr>
-        <p:spPr>
-          <a:xfrm>
-            <a:off x="9720179" y="2290474"/>
-            <a:ext cx="1354975" cy="806269"/>
-          </a:xfrm>
-          <a:prstGeom prst="rect">
-            <a:avLst/>
-          </a:prstGeom>
-          <a:solidFill>
-            <a:schemeClr val="accent1">
-              <a:lumMod val="50000"/>
-            </a:schemeClr>
-          </a:solidFill>
-          <a:ln>
-            <a:solidFill>
-              <a:schemeClr val="bg1"/>
-            </a:solidFill>
-          </a:ln>
-        </p:spPr>
-        <p:style>
-          <a:lnRef idx="2">
-            <a:schemeClr val="accent1">
-              <a:shade val="50000"/>
-            </a:schemeClr>
-          </a:lnRef>
-          <a:fillRef idx="1">
-            <a:schemeClr val="accent1"/>
-          </a:fillRef>
-          <a:effectRef idx="0">
-            <a:schemeClr val="accent1"/>
-          </a:effectRef>
-          <a:fontRef idx="minor">
-            <a:schemeClr val="lt1"/>
-          </a:fontRef>
-        </p:style>
-        <p:txBody>
-          <a:bodyPr rtlCol="0" anchor="ctr"/>
-          <a:lstStyle/>
-          <a:p>
-            <a:pPr algn="ctr"/>
-            <a:r>
-              <a:rPr lang="en-GB" dirty="0" smtClean="0"/>
-              <a:t>Player command</a:t>
-            </a:r>
-          </a:p>
-          <a:p>
-            <a:pPr algn="ctr"/>
-            <a:r>
-              <a:rPr lang="en-GB" dirty="0" smtClean="0"/>
-              <a:t>processing</a:t>
-            </a:r>
-            <a:endParaRPr lang="en-GB" dirty="0"/>
-          </a:p>
-        </p:txBody>
-      </p:sp>
-      <p:cxnSp>
-        <p:nvCxnSpPr>
-          <p:cNvPr id="49" name="Straight Arrow Connector 48"/>
-          <p:cNvCxnSpPr/>
-          <p:nvPr/>
-        </p:nvCxnSpPr>
-        <p:spPr>
-          <a:xfrm flipH="1" flipV="1">
-            <a:off x="3456016" y="3807261"/>
-            <a:ext cx="2838796" cy="24363"/>
-          </a:xfrm>
-          <a:prstGeom prst="straightConnector1">
-            <a:avLst/>
-          </a:prstGeom>
-          <a:ln w="38100">
-            <a:solidFill>
-              <a:schemeClr val="tx1"/>
-            </a:solidFill>
-            <a:tailEnd type="triangle"/>
-          </a:ln>
-        </p:spPr>
-        <p:style>
-          <a:lnRef idx="1">
-            <a:schemeClr val="accent1"/>
-          </a:lnRef>
-          <a:fillRef idx="0">
-            <a:schemeClr val="accent1"/>
-          </a:fillRef>
-          <a:effectRef idx="0">
-            <a:schemeClr val="accent1"/>
-          </a:effectRef>
-          <a:fontRef idx="minor">
-            <a:schemeClr val="tx1"/>
-          </a:fontRef>
-        </p:style>
-      </p:cxnSp>
-      <p:sp>
-        <p:nvSpPr>
-          <p:cNvPr id="54" name="TextBox 53"/>
-          <p:cNvSpPr txBox="1"/>
-          <p:nvPr/>
-        </p:nvSpPr>
-        <p:spPr>
-          <a:xfrm>
-            <a:off x="1841266" y="1043278"/>
-            <a:ext cx="1528504" cy="369332"/>
-          </a:xfrm>
-          <a:prstGeom prst="rect">
-            <a:avLst/>
-          </a:prstGeom>
-          <a:noFill/>
-        </p:spPr>
-        <p:txBody>
-          <a:bodyPr wrap="square" rtlCol="0">
-            <a:spAutoFit/>
-          </a:bodyPr>
-          <a:lstStyle/>
-          <a:p>
-            <a:r>
-              <a:rPr lang="en-GB" u="sng" dirty="0" smtClean="0"/>
-              <a:t>Main Threads</a:t>
-            </a:r>
-            <a:endParaRPr lang="en-GB" u="sng" dirty="0"/>
-          </a:p>
-        </p:txBody>
-      </p:sp>
-      <p:sp>
-        <p:nvSpPr>
-          <p:cNvPr id="61" name="Rectangle 60"/>
-          <p:cNvSpPr/>
-          <p:nvPr/>
-        </p:nvSpPr>
-        <p:spPr>
-          <a:xfrm>
-            <a:off x="9706668" y="3909813"/>
-            <a:ext cx="1354975" cy="806269"/>
-          </a:xfrm>
-          <a:prstGeom prst="rect">
-            <a:avLst/>
-          </a:prstGeom>
-          <a:solidFill>
-            <a:schemeClr val="accent1">
-              <a:lumMod val="50000"/>
-            </a:schemeClr>
-          </a:solidFill>
-          <a:ln>
-            <a:solidFill>
-              <a:schemeClr val="bg1"/>
-            </a:solidFill>
-          </a:ln>
-        </p:spPr>
-        <p:style>
-          <a:lnRef idx="2">
-            <a:schemeClr val="accent1">
-              <a:shade val="50000"/>
-            </a:schemeClr>
-          </a:lnRef>
-          <a:fillRef idx="1">
-            <a:schemeClr val="accent1"/>
-          </a:fillRef>
-          <a:effectRef idx="0">
-            <a:schemeClr val="accent1"/>
-          </a:effectRef>
-          <a:fontRef idx="minor">
-            <a:schemeClr val="lt1"/>
-          </a:fontRef>
-        </p:style>
-        <p:txBody>
-          <a:bodyPr rtlCol="0" anchor="ctr"/>
-          <a:lstStyle/>
-          <a:p>
-            <a:pPr algn="ctr"/>
-            <a:r>
-              <a:rPr lang="en-GB" dirty="0" smtClean="0"/>
-              <a:t>Game outputs</a:t>
-            </a:r>
-            <a:endParaRPr lang="en-GB" dirty="0"/>
-          </a:p>
-        </p:txBody>
-      </p:sp>
-      <p:cxnSp>
-        <p:nvCxnSpPr>
-          <p:cNvPr id="63" name="Straight Arrow Connector 62"/>
-          <p:cNvCxnSpPr>
-            <a:stCxn id="41" idx="3"/>
-          </p:cNvCxnSpPr>
-          <p:nvPr/>
-        </p:nvCxnSpPr>
-        <p:spPr>
-          <a:xfrm>
-            <a:off x="3354185" y="5095550"/>
-            <a:ext cx="6255329" cy="38467"/>
-          </a:xfrm>
-          <a:prstGeom prst="straightConnector1">
-            <a:avLst/>
-          </a:prstGeom>
-          <a:ln w="38100">
-            <a:solidFill>
-              <a:schemeClr val="tx1"/>
-            </a:solidFill>
-            <a:tailEnd type="triangle"/>
-          </a:ln>
-        </p:spPr>
-        <p:style>
-          <a:lnRef idx="1">
-            <a:schemeClr val="accent1"/>
-          </a:lnRef>
-          <a:fillRef idx="0">
-            <a:schemeClr val="accent1"/>
-          </a:fillRef>
-          <a:effectRef idx="0">
-            <a:schemeClr val="accent1"/>
-          </a:effectRef>
-          <a:fontRef idx="minor">
-            <a:schemeClr val="tx1"/>
-          </a:fontRef>
-        </p:style>
-      </p:cxnSp>
-      <p:sp>
-        <p:nvSpPr>
-          <p:cNvPr id="66" name="Rectangle 65"/>
-          <p:cNvSpPr/>
-          <p:nvPr/>
-        </p:nvSpPr>
-        <p:spPr>
-          <a:xfrm>
-            <a:off x="9706667" y="4774082"/>
-            <a:ext cx="1354975" cy="806269"/>
-          </a:xfrm>
-          <a:prstGeom prst="rect">
-            <a:avLst/>
-          </a:prstGeom>
-          <a:solidFill>
-            <a:schemeClr val="accent1">
-              <a:lumMod val="50000"/>
-            </a:schemeClr>
-          </a:solidFill>
-          <a:ln>
-            <a:solidFill>
-              <a:schemeClr val="bg1"/>
-            </a:solidFill>
-          </a:ln>
-        </p:spPr>
-        <p:style>
-          <a:lnRef idx="2">
-            <a:schemeClr val="accent1">
-              <a:shade val="50000"/>
-            </a:schemeClr>
-          </a:lnRef>
-          <a:fillRef idx="1">
-            <a:schemeClr val="accent1"/>
-          </a:fillRef>
-          <a:effectRef idx="0">
-            <a:schemeClr val="accent1"/>
-          </a:effectRef>
-          <a:fontRef idx="minor">
-            <a:schemeClr val="lt1"/>
-          </a:fontRef>
-        </p:style>
-        <p:txBody>
-          <a:bodyPr rtlCol="0" anchor="ctr"/>
-          <a:lstStyle/>
-          <a:p>
-            <a:pPr algn="ctr"/>
-            <a:r>
-              <a:rPr lang="en-GB" dirty="0" smtClean="0"/>
-              <a:t>Set player exiting flag</a:t>
-            </a:r>
-            <a:endParaRPr lang="en-GB" dirty="0"/>
-          </a:p>
-        </p:txBody>
-      </p:sp>
-      <p:sp>
-        <p:nvSpPr>
-          <p:cNvPr id="68" name="Rectangle 67"/>
-          <p:cNvSpPr/>
-          <p:nvPr/>
-        </p:nvSpPr>
-        <p:spPr>
-          <a:xfrm>
-            <a:off x="9706667" y="1444078"/>
-            <a:ext cx="1354975" cy="806269"/>
-          </a:xfrm>
-          <a:prstGeom prst="rect">
-            <a:avLst/>
-          </a:prstGeom>
-          <a:solidFill>
-            <a:schemeClr val="accent1">
-              <a:lumMod val="50000"/>
-            </a:schemeClr>
-          </a:solidFill>
-          <a:ln>
-            <a:solidFill>
-              <a:schemeClr val="bg1"/>
-            </a:solidFill>
-          </a:ln>
-        </p:spPr>
-        <p:style>
-          <a:lnRef idx="2">
-            <a:schemeClr val="accent1">
-              <a:shade val="50000"/>
-            </a:schemeClr>
-          </a:lnRef>
-          <a:fillRef idx="1">
-            <a:schemeClr val="accent1"/>
-          </a:fillRef>
-          <a:effectRef idx="0">
-            <a:schemeClr val="accent1"/>
-          </a:effectRef>
-          <a:fontRef idx="minor">
-            <a:schemeClr val="lt1"/>
-          </a:fontRef>
-        </p:style>
-        <p:txBody>
-          <a:bodyPr rtlCol="0" anchor="ctr"/>
-          <a:lstStyle/>
-          <a:p>
-            <a:pPr algn="ctr"/>
-            <a:r>
-              <a:rPr lang="en-GB" dirty="0" smtClean="0"/>
-              <a:t>Remove flagged players</a:t>
-            </a:r>
-            <a:endParaRPr lang="en-GB" dirty="0"/>
-          </a:p>
-        </p:txBody>
-      </p:sp>
-      <p:sp>
-        <p:nvSpPr>
-          <p:cNvPr id="70" name="TextBox 69"/>
-          <p:cNvSpPr txBox="1"/>
-          <p:nvPr/>
-        </p:nvSpPr>
-        <p:spPr>
-          <a:xfrm>
-            <a:off x="452522" y="1057567"/>
-            <a:ext cx="1528504" cy="369332"/>
-          </a:xfrm>
-          <a:prstGeom prst="rect">
-            <a:avLst/>
-          </a:prstGeom>
-          <a:noFill/>
-        </p:spPr>
-        <p:txBody>
-          <a:bodyPr wrap="square" rtlCol="0">
-            <a:spAutoFit/>
-          </a:bodyPr>
-          <a:lstStyle/>
-          <a:p>
-            <a:r>
-              <a:rPr lang="en-GB" u="sng" dirty="0" smtClean="0"/>
-              <a:t>UI Thread</a:t>
-            </a:r>
-            <a:endParaRPr lang="en-GB" u="sng" dirty="0"/>
-          </a:p>
-        </p:txBody>
-      </p:sp>
-      <p:sp>
-        <p:nvSpPr>
-          <p:cNvPr id="71" name="Rectangle 70"/>
-          <p:cNvSpPr/>
-          <p:nvPr/>
-        </p:nvSpPr>
-        <p:spPr>
-          <a:xfrm>
-            <a:off x="354861" y="1859089"/>
-            <a:ext cx="1354975" cy="567604"/>
-          </a:xfrm>
-          <a:prstGeom prst="rect">
-            <a:avLst/>
-          </a:prstGeom>
-          <a:solidFill>
-            <a:schemeClr val="accent1">
-              <a:lumMod val="50000"/>
-            </a:schemeClr>
-          </a:solidFill>
-          <a:ln>
-            <a:solidFill>
-              <a:schemeClr val="bg1"/>
-            </a:solidFill>
-          </a:ln>
-        </p:spPr>
-        <p:style>
-          <a:lnRef idx="2">
-            <a:schemeClr val="accent1">
-              <a:shade val="50000"/>
-            </a:schemeClr>
-          </a:lnRef>
-          <a:fillRef idx="1">
-            <a:schemeClr val="accent1"/>
-          </a:fillRef>
-          <a:effectRef idx="0">
-            <a:schemeClr val="accent1"/>
-          </a:effectRef>
-          <a:fontRef idx="minor">
-            <a:schemeClr val="lt1"/>
-          </a:fontRef>
-        </p:style>
-        <p:txBody>
-          <a:bodyPr rtlCol="0" anchor="ctr"/>
-          <a:lstStyle/>
-          <a:p>
-            <a:pPr algn="ctr"/>
-            <a:r>
-              <a:rPr lang="en-GB" dirty="0" smtClean="0"/>
-              <a:t>Inform of status</a:t>
-            </a:r>
-            <a:endParaRPr lang="en-GB" dirty="0"/>
-          </a:p>
-        </p:txBody>
-      </p:sp>
-      <p:cxnSp>
-        <p:nvCxnSpPr>
-          <p:cNvPr id="72" name="Straight Arrow Connector 71"/>
-          <p:cNvCxnSpPr>
-            <a:endCxn id="71" idx="3"/>
-          </p:cNvCxnSpPr>
-          <p:nvPr/>
-        </p:nvCxnSpPr>
-        <p:spPr>
-          <a:xfrm flipH="1" flipV="1">
-            <a:off x="1709836" y="2142891"/>
-            <a:ext cx="196734" cy="57952"/>
-          </a:xfrm>
-          <a:prstGeom prst="straightConnector1">
-            <a:avLst/>
-          </a:prstGeom>
-          <a:ln w="38100">
-            <a:solidFill>
-              <a:schemeClr val="tx1"/>
-            </a:solidFill>
-            <a:tailEnd type="triangle"/>
-          </a:ln>
-        </p:spPr>
-        <p:style>
-          <a:lnRef idx="1">
-            <a:schemeClr val="accent1"/>
-          </a:lnRef>
-          <a:fillRef idx="0">
-            <a:schemeClr val="accent1"/>
-          </a:fillRef>
-          <a:effectRef idx="0">
-            <a:schemeClr val="accent1"/>
-          </a:effectRef>
-          <a:fontRef idx="minor">
-            <a:schemeClr val="tx1"/>
-          </a:fontRef>
-        </p:style>
-      </p:cxnSp>
-      <p:sp>
-        <p:nvSpPr>
-          <p:cNvPr id="75" name="Rectangle 74"/>
-          <p:cNvSpPr/>
-          <p:nvPr/>
-        </p:nvSpPr>
-        <p:spPr>
-          <a:xfrm>
-            <a:off x="391222" y="3686625"/>
-            <a:ext cx="1354975" cy="586658"/>
-          </a:xfrm>
-          <a:prstGeom prst="rect">
-            <a:avLst/>
-          </a:prstGeom>
-          <a:solidFill>
-            <a:schemeClr val="accent1">
-              <a:lumMod val="50000"/>
-            </a:schemeClr>
-          </a:solidFill>
-          <a:ln>
-            <a:solidFill>
-              <a:schemeClr val="bg1"/>
-            </a:solidFill>
-          </a:ln>
-        </p:spPr>
-        <p:style>
-          <a:lnRef idx="2">
-            <a:schemeClr val="accent1">
-              <a:shade val="50000"/>
-            </a:schemeClr>
-          </a:lnRef>
-          <a:fillRef idx="1">
-            <a:schemeClr val="accent1"/>
-          </a:fillRef>
-          <a:effectRef idx="0">
-            <a:schemeClr val="accent1"/>
-          </a:effectRef>
-          <a:fontRef idx="minor">
-            <a:schemeClr val="lt1"/>
-          </a:fontRef>
-        </p:style>
-        <p:txBody>
-          <a:bodyPr rtlCol="0" anchor="ctr"/>
-          <a:lstStyle/>
-          <a:p>
-            <a:pPr algn="ctr"/>
-            <a:r>
-              <a:rPr lang="en-GB" dirty="0" smtClean="0"/>
-              <a:t>Add to output box</a:t>
-            </a:r>
-            <a:endParaRPr lang="en-GB" dirty="0"/>
-          </a:p>
-        </p:txBody>
-      </p:sp>
-      <p:sp>
-        <p:nvSpPr>
-          <p:cNvPr id="77" name="Rectangle 76"/>
-          <p:cNvSpPr/>
-          <p:nvPr/>
-        </p:nvSpPr>
-        <p:spPr>
-          <a:xfrm>
-            <a:off x="391209" y="2937768"/>
-            <a:ext cx="1354975" cy="574149"/>
-          </a:xfrm>
-          <a:prstGeom prst="rect">
-            <a:avLst/>
-          </a:prstGeom>
-          <a:solidFill>
-            <a:schemeClr val="accent1">
-              <a:lumMod val="50000"/>
-            </a:schemeClr>
-          </a:solidFill>
-          <a:ln>
-            <a:solidFill>
-              <a:schemeClr val="bg1"/>
-            </a:solidFill>
-          </a:ln>
-        </p:spPr>
-        <p:style>
-          <a:lnRef idx="2">
-            <a:schemeClr val="accent1">
-              <a:shade val="50000"/>
-            </a:schemeClr>
-          </a:lnRef>
-          <a:fillRef idx="1">
-            <a:schemeClr val="accent1"/>
-          </a:fillRef>
-          <a:effectRef idx="0">
-            <a:schemeClr val="accent1"/>
-          </a:effectRef>
-          <a:fontRef idx="minor">
-            <a:schemeClr val="lt1"/>
-          </a:fontRef>
-        </p:style>
-        <p:txBody>
-          <a:bodyPr rtlCol="0" anchor="ctr"/>
-          <a:lstStyle/>
-          <a:p>
-            <a:pPr algn="ctr"/>
-            <a:r>
-              <a:rPr lang="en-GB" dirty="0" smtClean="0"/>
-              <a:t>Submitting input box</a:t>
-            </a:r>
-            <a:endParaRPr lang="en-GB" dirty="0"/>
-          </a:p>
-        </p:txBody>
-      </p:sp>
-      <p:cxnSp>
-        <p:nvCxnSpPr>
-          <p:cNvPr id="78" name="Straight Arrow Connector 77"/>
-          <p:cNvCxnSpPr/>
-          <p:nvPr/>
-        </p:nvCxnSpPr>
-        <p:spPr>
-          <a:xfrm>
-            <a:off x="1728793" y="3271393"/>
-            <a:ext cx="418238" cy="0"/>
-          </a:xfrm>
-          <a:prstGeom prst="straightConnector1">
-            <a:avLst/>
-          </a:prstGeom>
-          <a:ln w="38100">
-            <a:solidFill>
-              <a:schemeClr val="tx1"/>
-            </a:solidFill>
-            <a:tailEnd type="triangle"/>
-          </a:ln>
-        </p:spPr>
-        <p:style>
-          <a:lnRef idx="1">
-            <a:schemeClr val="accent1"/>
-          </a:lnRef>
-          <a:fillRef idx="0">
-            <a:schemeClr val="accent1"/>
-          </a:fillRef>
-          <a:effectRef idx="0">
-            <a:schemeClr val="accent1"/>
-          </a:effectRef>
-          <a:fontRef idx="minor">
-            <a:schemeClr val="tx1"/>
-          </a:fontRef>
-        </p:style>
-      </p:cxnSp>
-      <p:cxnSp>
-        <p:nvCxnSpPr>
-          <p:cNvPr id="83" name="Straight Arrow Connector 82"/>
-          <p:cNvCxnSpPr>
-            <a:endCxn id="75" idx="3"/>
-          </p:cNvCxnSpPr>
-          <p:nvPr/>
-        </p:nvCxnSpPr>
-        <p:spPr>
-          <a:xfrm flipH="1" flipV="1">
-            <a:off x="1746197" y="3979954"/>
-            <a:ext cx="409222" cy="13386"/>
-          </a:xfrm>
-          <a:prstGeom prst="straightConnector1">
-            <a:avLst/>
-          </a:prstGeom>
-          <a:ln w="38100">
-            <a:solidFill>
-              <a:schemeClr val="tx1"/>
-            </a:solidFill>
-            <a:tailEnd type="triangle"/>
-          </a:ln>
-        </p:spPr>
-        <p:style>
-          <a:lnRef idx="1">
-            <a:schemeClr val="accent1"/>
-          </a:lnRef>
-          <a:fillRef idx="0">
-            <a:schemeClr val="accent1"/>
-          </a:fillRef>
-          <a:effectRef idx="0">
-            <a:schemeClr val="accent1"/>
-          </a:effectRef>
-          <a:fontRef idx="minor">
-            <a:schemeClr val="tx1"/>
-          </a:fontRef>
-        </p:style>
-      </p:cxnSp>
-      <p:sp>
-        <p:nvSpPr>
-          <p:cNvPr id="86" name="Rectangle 85"/>
-          <p:cNvSpPr/>
-          <p:nvPr/>
-        </p:nvSpPr>
-        <p:spPr>
-          <a:xfrm>
-            <a:off x="294325" y="4774082"/>
-            <a:ext cx="1465119" cy="583221"/>
-          </a:xfrm>
-          <a:prstGeom prst="rect">
-            <a:avLst/>
-          </a:prstGeom>
-          <a:solidFill>
-            <a:schemeClr val="accent1">
-              <a:lumMod val="50000"/>
-            </a:schemeClr>
-          </a:solidFill>
-          <a:ln>
-            <a:solidFill>
-              <a:schemeClr val="bg1"/>
-            </a:solidFill>
-          </a:ln>
-        </p:spPr>
-        <p:style>
-          <a:lnRef idx="2">
-            <a:schemeClr val="accent1">
-              <a:shade val="50000"/>
-            </a:schemeClr>
-          </a:lnRef>
-          <a:fillRef idx="1">
-            <a:schemeClr val="accent1"/>
-          </a:fillRef>
-          <a:effectRef idx="0">
-            <a:schemeClr val="accent1"/>
-          </a:effectRef>
-          <a:fontRef idx="minor">
-            <a:schemeClr val="lt1"/>
-          </a:fontRef>
-        </p:style>
-        <p:txBody>
-          <a:bodyPr rtlCol="0" anchor="t"/>
-          <a:lstStyle/>
-          <a:p>
-            <a:pPr algn="ctr"/>
-            <a:r>
-              <a:rPr lang="en-GB" dirty="0" smtClean="0"/>
-              <a:t>Close window</a:t>
-            </a:r>
-            <a:endParaRPr lang="en-GB" dirty="0"/>
-          </a:p>
-        </p:txBody>
-      </p:sp>
-      <p:cxnSp>
-        <p:nvCxnSpPr>
-          <p:cNvPr id="88" name="Straight Arrow Connector 87"/>
-          <p:cNvCxnSpPr/>
-          <p:nvPr/>
-        </p:nvCxnSpPr>
-        <p:spPr>
-          <a:xfrm flipH="1">
-            <a:off x="1713459" y="4930503"/>
-            <a:ext cx="277438" cy="1"/>
-          </a:xfrm>
-          <a:prstGeom prst="straightConnector1">
-            <a:avLst/>
-          </a:prstGeom>
-          <a:ln w="38100">
-            <a:solidFill>
-              <a:schemeClr val="tx1"/>
-            </a:solidFill>
-            <a:tailEnd type="triangle"/>
-          </a:ln>
-        </p:spPr>
-        <p:style>
-          <a:lnRef idx="1">
-            <a:schemeClr val="accent1"/>
-          </a:lnRef>
-          <a:fillRef idx="0">
-            <a:schemeClr val="accent1"/>
-          </a:fillRef>
-          <a:effectRef idx="0">
-            <a:schemeClr val="accent1"/>
-          </a:effectRef>
-          <a:fontRef idx="minor">
-            <a:schemeClr val="tx1"/>
-          </a:fontRef>
-        </p:style>
-      </p:cxnSp>
-      <p:cxnSp>
-        <p:nvCxnSpPr>
-          <p:cNvPr id="91" name="Straight Arrow Connector 90"/>
-          <p:cNvCxnSpPr/>
-          <p:nvPr/>
-        </p:nvCxnSpPr>
-        <p:spPr>
-          <a:xfrm>
-            <a:off x="1746184" y="5223466"/>
-            <a:ext cx="282459" cy="7400"/>
-          </a:xfrm>
-          <a:prstGeom prst="straightConnector1">
-            <a:avLst/>
-          </a:prstGeom>
-          <a:ln w="38100">
-            <a:solidFill>
-              <a:schemeClr val="tx1"/>
-            </a:solidFill>
-            <a:tailEnd type="triangle"/>
-          </a:ln>
-        </p:spPr>
-        <p:style>
-          <a:lnRef idx="1">
-            <a:schemeClr val="accent1"/>
-          </a:lnRef>
-          <a:fillRef idx="0">
-            <a:schemeClr val="accent1"/>
-          </a:fillRef>
-          <a:effectRef idx="0">
-            <a:schemeClr val="accent1"/>
-          </a:effectRef>
-          <a:fontRef idx="minor">
-            <a:schemeClr val="tx1"/>
-          </a:fontRef>
-        </p:style>
-      </p:cxnSp>
-      <p:sp>
-        <p:nvSpPr>
-          <p:cNvPr id="98" name="Rectangle 97"/>
-          <p:cNvSpPr/>
-          <p:nvPr/>
-        </p:nvSpPr>
-        <p:spPr>
-          <a:xfrm>
-            <a:off x="1938437" y="1480892"/>
-            <a:ext cx="1354975" cy="299962"/>
-          </a:xfrm>
-          <a:prstGeom prst="rect">
-            <a:avLst/>
-          </a:prstGeom>
-          <a:solidFill>
-            <a:schemeClr val="accent1">
-              <a:lumMod val="50000"/>
-            </a:schemeClr>
-          </a:solidFill>
-          <a:ln>
-            <a:solidFill>
-              <a:schemeClr val="bg1"/>
-            </a:solidFill>
-          </a:ln>
-        </p:spPr>
-        <p:style>
-          <a:lnRef idx="2">
-            <a:schemeClr val="accent1">
-              <a:shade val="50000"/>
-            </a:schemeClr>
-          </a:lnRef>
-          <a:fillRef idx="1">
-            <a:schemeClr val="accent1"/>
-          </a:fillRef>
-          <a:effectRef idx="0">
-            <a:schemeClr val="accent1"/>
-          </a:effectRef>
-          <a:fontRef idx="minor">
-            <a:schemeClr val="lt1"/>
-          </a:fontRef>
-        </p:style>
-        <p:txBody>
-          <a:bodyPr rtlCol="0" anchor="ctr"/>
-          <a:lstStyle/>
-          <a:p>
-            <a:pPr algn="ctr"/>
-            <a:r>
-              <a:rPr lang="en-GB" dirty="0" smtClean="0"/>
-              <a:t>Create UI</a:t>
-            </a:r>
-            <a:endParaRPr lang="en-GB" dirty="0"/>
-          </a:p>
-        </p:txBody>
-      </p:sp>
-      <p:cxnSp>
-        <p:nvCxnSpPr>
-          <p:cNvPr id="101" name="Straight Connector 100"/>
-          <p:cNvCxnSpPr>
-            <a:stCxn id="98" idx="2"/>
-            <a:endCxn id="20" idx="0"/>
-          </p:cNvCxnSpPr>
-          <p:nvPr/>
-        </p:nvCxnSpPr>
-        <p:spPr>
-          <a:xfrm>
-            <a:off x="2615925" y="1780854"/>
-            <a:ext cx="1556" cy="78235"/>
+            <a:off x="1261185" y="2991959"/>
+            <a:ext cx="28861" cy="2347389"/>
           </a:xfrm>
           <a:prstGeom prst="line">
             <a:avLst/>
@@ -4704,33 +3047,1703 @@
           </a:fontRef>
         </p:style>
       </p:cxnSp>
+      <p:sp>
+        <p:nvSpPr>
+          <p:cNvPr id="57" name="Rectangle 56"/>
+          <p:cNvSpPr/>
+          <p:nvPr/>
+        </p:nvSpPr>
+        <p:spPr>
+          <a:xfrm>
+            <a:off x="430956" y="1605144"/>
+            <a:ext cx="1737360" cy="4619472"/>
+          </a:xfrm>
+          <a:prstGeom prst="rect">
+            <a:avLst/>
+          </a:prstGeom>
+        </p:spPr>
+        <p:style>
+          <a:lnRef idx="2">
+            <a:schemeClr val="accent1">
+              <a:shade val="50000"/>
+            </a:schemeClr>
+          </a:lnRef>
+          <a:fillRef idx="1">
+            <a:schemeClr val="accent1"/>
+          </a:fillRef>
+          <a:effectRef idx="0">
+            <a:schemeClr val="accent1"/>
+          </a:effectRef>
+          <a:fontRef idx="minor">
+            <a:schemeClr val="lt1"/>
+          </a:fontRef>
+        </p:style>
+        <p:txBody>
+          <a:bodyPr rtlCol="0" anchor="ctr"/>
+          <a:lstStyle/>
+          <a:p>
+            <a:pPr algn="ctr"/>
+            <a:endParaRPr lang="en-GB"/>
+          </a:p>
+        </p:txBody>
+      </p:sp>
+      <p:sp>
+        <p:nvSpPr>
+          <p:cNvPr id="56" name="Rectangle 55"/>
+          <p:cNvSpPr/>
+          <p:nvPr/>
+        </p:nvSpPr>
+        <p:spPr>
+          <a:xfrm>
+            <a:off x="2208570" y="1603615"/>
+            <a:ext cx="1737360" cy="4619472"/>
+          </a:xfrm>
+          <a:prstGeom prst="rect">
+            <a:avLst/>
+          </a:prstGeom>
+        </p:spPr>
+        <p:style>
+          <a:lnRef idx="2">
+            <a:schemeClr val="accent1">
+              <a:shade val="50000"/>
+            </a:schemeClr>
+          </a:lnRef>
+          <a:fillRef idx="1">
+            <a:schemeClr val="accent1"/>
+          </a:fillRef>
+          <a:effectRef idx="0">
+            <a:schemeClr val="accent1"/>
+          </a:effectRef>
+          <a:fontRef idx="minor">
+            <a:schemeClr val="lt1"/>
+          </a:fontRef>
+        </p:style>
+        <p:txBody>
+          <a:bodyPr rtlCol="0" anchor="ctr"/>
+          <a:lstStyle/>
+          <a:p>
+            <a:pPr algn="ctr"/>
+            <a:endParaRPr lang="en-GB"/>
+          </a:p>
+        </p:txBody>
+      </p:sp>
+      <p:sp>
+        <p:nvSpPr>
+          <p:cNvPr id="6" name="Rectangle 5"/>
+          <p:cNvSpPr/>
+          <p:nvPr/>
+        </p:nvSpPr>
+        <p:spPr>
+          <a:xfrm>
+            <a:off x="4326521" y="1105592"/>
+            <a:ext cx="7435990" cy="5253644"/>
+          </a:xfrm>
+          <a:prstGeom prst="rect">
+            <a:avLst/>
+          </a:prstGeom>
+          <a:solidFill>
+            <a:schemeClr val="accent1">
+              <a:lumMod val="60000"/>
+              <a:lumOff val="40000"/>
+            </a:schemeClr>
+          </a:solidFill>
+        </p:spPr>
+        <p:style>
+          <a:lnRef idx="2">
+            <a:schemeClr val="accent1">
+              <a:shade val="50000"/>
+            </a:schemeClr>
+          </a:lnRef>
+          <a:fillRef idx="1">
+            <a:schemeClr val="accent1"/>
+          </a:fillRef>
+          <a:effectRef idx="0">
+            <a:schemeClr val="accent1"/>
+          </a:effectRef>
+          <a:fontRef idx="minor">
+            <a:schemeClr val="lt1"/>
+          </a:fontRef>
+        </p:style>
+        <p:txBody>
+          <a:bodyPr rtlCol="0" anchor="ctr"/>
+          <a:lstStyle/>
+          <a:p>
+            <a:pPr algn="ctr"/>
+            <a:endParaRPr lang="en-GB"/>
+          </a:p>
+        </p:txBody>
+      </p:sp>
+      <p:sp>
+        <p:nvSpPr>
+          <p:cNvPr id="55" name="Rectangle 54"/>
+          <p:cNvSpPr/>
+          <p:nvPr/>
+        </p:nvSpPr>
+        <p:spPr>
+          <a:xfrm>
+            <a:off x="4441859" y="1609117"/>
+            <a:ext cx="1737360" cy="4619472"/>
+          </a:xfrm>
+          <a:prstGeom prst="rect">
+            <a:avLst/>
+          </a:prstGeom>
+        </p:spPr>
+        <p:style>
+          <a:lnRef idx="2">
+            <a:schemeClr val="accent1">
+              <a:shade val="50000"/>
+            </a:schemeClr>
+          </a:lnRef>
+          <a:fillRef idx="1">
+            <a:schemeClr val="accent1"/>
+          </a:fillRef>
+          <a:effectRef idx="0">
+            <a:schemeClr val="accent1"/>
+          </a:effectRef>
+          <a:fontRef idx="minor">
+            <a:schemeClr val="lt1"/>
+          </a:fontRef>
+        </p:style>
+        <p:txBody>
+          <a:bodyPr rtlCol="0" anchor="ctr"/>
+          <a:lstStyle/>
+          <a:p>
+            <a:pPr algn="ctr"/>
+            <a:endParaRPr lang="en-GB"/>
+          </a:p>
+        </p:txBody>
+      </p:sp>
+      <p:sp>
+        <p:nvSpPr>
+          <p:cNvPr id="53" name="Rectangle 52"/>
+          <p:cNvSpPr/>
+          <p:nvPr/>
+        </p:nvSpPr>
+        <p:spPr>
+          <a:xfrm>
+            <a:off x="6255334" y="1612670"/>
+            <a:ext cx="1737360" cy="4623094"/>
+          </a:xfrm>
+          <a:prstGeom prst="rect">
+            <a:avLst/>
+          </a:prstGeom>
+        </p:spPr>
+        <p:style>
+          <a:lnRef idx="2">
+            <a:schemeClr val="accent1">
+              <a:shade val="50000"/>
+            </a:schemeClr>
+          </a:lnRef>
+          <a:fillRef idx="1">
+            <a:schemeClr val="accent1"/>
+          </a:fillRef>
+          <a:effectRef idx="0">
+            <a:schemeClr val="accent1"/>
+          </a:effectRef>
+          <a:fontRef idx="minor">
+            <a:schemeClr val="lt1"/>
+          </a:fontRef>
+        </p:style>
+        <p:txBody>
+          <a:bodyPr rtlCol="0" anchor="ctr"/>
+          <a:lstStyle/>
+          <a:p>
+            <a:pPr algn="ctr"/>
+            <a:endParaRPr lang="en-GB"/>
+          </a:p>
+        </p:txBody>
+      </p:sp>
+      <p:sp>
+        <p:nvSpPr>
+          <p:cNvPr id="52" name="Rectangle 51"/>
+          <p:cNvSpPr/>
+          <p:nvPr/>
+        </p:nvSpPr>
+        <p:spPr>
+          <a:xfrm>
+            <a:off x="8082046" y="1614520"/>
+            <a:ext cx="1737360" cy="4619472"/>
+          </a:xfrm>
+          <a:prstGeom prst="rect">
+            <a:avLst/>
+          </a:prstGeom>
+        </p:spPr>
+        <p:style>
+          <a:lnRef idx="2">
+            <a:schemeClr val="accent1">
+              <a:shade val="50000"/>
+            </a:schemeClr>
+          </a:lnRef>
+          <a:fillRef idx="1">
+            <a:schemeClr val="accent1"/>
+          </a:fillRef>
+          <a:effectRef idx="0">
+            <a:schemeClr val="accent1"/>
+          </a:effectRef>
+          <a:fontRef idx="minor">
+            <a:schemeClr val="lt1"/>
+          </a:fontRef>
+        </p:style>
+        <p:txBody>
+          <a:bodyPr rtlCol="0" anchor="ctr"/>
+          <a:lstStyle/>
+          <a:p>
+            <a:pPr algn="ctr"/>
+            <a:endParaRPr lang="en-GB"/>
+          </a:p>
+        </p:txBody>
+      </p:sp>
+      <p:sp>
+        <p:nvSpPr>
+          <p:cNvPr id="5" name="TextBox 4"/>
+          <p:cNvSpPr txBox="1"/>
+          <p:nvPr/>
+        </p:nvSpPr>
+        <p:spPr>
+          <a:xfrm>
+            <a:off x="307573" y="1073785"/>
+            <a:ext cx="3749040" cy="523220"/>
+          </a:xfrm>
+          <a:prstGeom prst="rect">
+            <a:avLst/>
+          </a:prstGeom>
+          <a:noFill/>
+        </p:spPr>
+        <p:txBody>
+          <a:bodyPr wrap="square" rtlCol="0">
+            <a:spAutoFit/>
+          </a:bodyPr>
+          <a:lstStyle/>
+          <a:p>
+            <a:pPr algn="ctr"/>
+            <a:r>
+              <a:rPr lang="en-GB" sz="2800" dirty="0" smtClean="0"/>
+              <a:t>Client</a:t>
+            </a:r>
+            <a:endParaRPr lang="en-GB" sz="2800" dirty="0"/>
+          </a:p>
+        </p:txBody>
+      </p:sp>
+      <p:sp>
+        <p:nvSpPr>
+          <p:cNvPr id="7" name="TextBox 6"/>
+          <p:cNvSpPr txBox="1"/>
+          <p:nvPr/>
+        </p:nvSpPr>
+        <p:spPr>
+          <a:xfrm>
+            <a:off x="7622772" y="1065298"/>
+            <a:ext cx="1126381" cy="523220"/>
+          </a:xfrm>
+          <a:prstGeom prst="rect">
+            <a:avLst/>
+          </a:prstGeom>
+          <a:noFill/>
+        </p:spPr>
+        <p:txBody>
+          <a:bodyPr wrap="square" rtlCol="0">
+            <a:spAutoFit/>
+          </a:bodyPr>
+          <a:lstStyle/>
+          <a:p>
+            <a:r>
+              <a:rPr lang="en-GB" sz="2800" dirty="0" smtClean="0"/>
+              <a:t>Server</a:t>
+            </a:r>
+            <a:endParaRPr lang="en-GB" sz="2800" dirty="0"/>
+          </a:p>
+        </p:txBody>
+      </p:sp>
+      <p:sp>
+        <p:nvSpPr>
+          <p:cNvPr id="16" name="Rectangle 15"/>
+          <p:cNvSpPr/>
+          <p:nvPr/>
+        </p:nvSpPr>
+        <p:spPr>
+          <a:xfrm>
+            <a:off x="9917082" y="1623386"/>
+            <a:ext cx="1737360" cy="4619472"/>
+          </a:xfrm>
+          <a:prstGeom prst="rect">
+            <a:avLst/>
+          </a:prstGeom>
+        </p:spPr>
+        <p:style>
+          <a:lnRef idx="2">
+            <a:schemeClr val="accent1">
+              <a:shade val="50000"/>
+            </a:schemeClr>
+          </a:lnRef>
+          <a:fillRef idx="1">
+            <a:schemeClr val="accent1"/>
+          </a:fillRef>
+          <a:effectRef idx="0">
+            <a:schemeClr val="accent1"/>
+          </a:effectRef>
+          <a:fontRef idx="minor">
+            <a:schemeClr val="lt1"/>
+          </a:fontRef>
+        </p:style>
+        <p:txBody>
+          <a:bodyPr rtlCol="0" anchor="ctr"/>
+          <a:lstStyle/>
+          <a:p>
+            <a:pPr algn="ctr"/>
+            <a:endParaRPr lang="en-GB"/>
+          </a:p>
+        </p:txBody>
+      </p:sp>
+      <p:sp>
+        <p:nvSpPr>
+          <p:cNvPr id="8" name="TextBox 7"/>
+          <p:cNvSpPr txBox="1"/>
+          <p:nvPr/>
+        </p:nvSpPr>
+        <p:spPr>
+          <a:xfrm>
+            <a:off x="4441858" y="1631699"/>
+            <a:ext cx="1732436" cy="369332"/>
+          </a:xfrm>
+          <a:prstGeom prst="rect">
+            <a:avLst/>
+          </a:prstGeom>
+          <a:noFill/>
+        </p:spPr>
+        <p:txBody>
+          <a:bodyPr wrap="square" rtlCol="0">
+            <a:spAutoFit/>
+          </a:bodyPr>
+          <a:lstStyle/>
+          <a:p>
+            <a:pPr algn="ctr"/>
+            <a:r>
+              <a:rPr lang="en-GB" dirty="0" err="1" smtClean="0"/>
+              <a:t>Recv</a:t>
+            </a:r>
+            <a:r>
+              <a:rPr lang="en-GB" dirty="0" smtClean="0"/>
+              <a:t> Thread</a:t>
+            </a:r>
+            <a:endParaRPr lang="en-GB" dirty="0"/>
+          </a:p>
+        </p:txBody>
+      </p:sp>
+      <p:sp>
+        <p:nvSpPr>
+          <p:cNvPr id="9" name="TextBox 8"/>
+          <p:cNvSpPr txBox="1"/>
+          <p:nvPr/>
+        </p:nvSpPr>
+        <p:spPr>
+          <a:xfrm>
+            <a:off x="6255333" y="1631699"/>
+            <a:ext cx="1737361" cy="369332"/>
+          </a:xfrm>
+          <a:prstGeom prst="rect">
+            <a:avLst/>
+          </a:prstGeom>
+          <a:noFill/>
+        </p:spPr>
+        <p:txBody>
+          <a:bodyPr wrap="square" rtlCol="0">
+            <a:spAutoFit/>
+          </a:bodyPr>
+          <a:lstStyle/>
+          <a:p>
+            <a:pPr algn="ctr"/>
+            <a:r>
+              <a:rPr lang="en-GB" dirty="0" smtClean="0"/>
+              <a:t>Send Thread</a:t>
+            </a:r>
+            <a:endParaRPr lang="en-GB" dirty="0"/>
+          </a:p>
+        </p:txBody>
+      </p:sp>
+      <p:sp>
+        <p:nvSpPr>
+          <p:cNvPr id="10" name="TextBox 9"/>
+          <p:cNvSpPr txBox="1"/>
+          <p:nvPr/>
+        </p:nvSpPr>
+        <p:spPr>
+          <a:xfrm>
+            <a:off x="8043612" y="1623386"/>
+            <a:ext cx="1775793" cy="369332"/>
+          </a:xfrm>
+          <a:prstGeom prst="rect">
+            <a:avLst/>
+          </a:prstGeom>
+          <a:noFill/>
+        </p:spPr>
+        <p:txBody>
+          <a:bodyPr wrap="square" rtlCol="0">
+            <a:spAutoFit/>
+          </a:bodyPr>
+          <a:lstStyle/>
+          <a:p>
+            <a:pPr algn="ctr"/>
+            <a:r>
+              <a:rPr lang="en-GB" dirty="0" smtClean="0"/>
+              <a:t>Accept Thread</a:t>
+            </a:r>
+            <a:endParaRPr lang="en-GB" dirty="0"/>
+          </a:p>
+        </p:txBody>
+      </p:sp>
+      <p:sp>
+        <p:nvSpPr>
+          <p:cNvPr id="11" name="TextBox 10"/>
+          <p:cNvSpPr txBox="1"/>
+          <p:nvPr/>
+        </p:nvSpPr>
+        <p:spPr>
+          <a:xfrm>
+            <a:off x="9917082" y="1615074"/>
+            <a:ext cx="1729047" cy="369332"/>
+          </a:xfrm>
+          <a:prstGeom prst="rect">
+            <a:avLst/>
+          </a:prstGeom>
+          <a:noFill/>
+        </p:spPr>
+        <p:txBody>
+          <a:bodyPr wrap="square" rtlCol="0">
+            <a:spAutoFit/>
+          </a:bodyPr>
+          <a:lstStyle/>
+          <a:p>
+            <a:pPr algn="ctr"/>
+            <a:r>
+              <a:rPr lang="en-GB" dirty="0" smtClean="0"/>
+              <a:t>Game Thread</a:t>
+            </a:r>
+            <a:endParaRPr lang="en-GB" dirty="0"/>
+          </a:p>
+        </p:txBody>
+      </p:sp>
       <p:cxnSp>
         <p:nvCxnSpPr>
-          <p:cNvPr id="104" name="Straight Connector 103"/>
+          <p:cNvPr id="18" name="Straight Arrow Connector 17"/>
+          <p:cNvCxnSpPr/>
+          <p:nvPr/>
+        </p:nvCxnSpPr>
+        <p:spPr>
+          <a:xfrm>
+            <a:off x="3716839" y="2508685"/>
+            <a:ext cx="4579267" cy="6407"/>
+          </a:xfrm>
+          <a:prstGeom prst="straightConnector1">
+            <a:avLst/>
+          </a:prstGeom>
+          <a:ln w="38100">
+            <a:solidFill>
+              <a:schemeClr val="tx1"/>
+            </a:solidFill>
+            <a:tailEnd type="triangle"/>
+          </a:ln>
+        </p:spPr>
+        <p:style>
+          <a:lnRef idx="1">
+            <a:schemeClr val="accent1"/>
+          </a:lnRef>
+          <a:fillRef idx="0">
+            <a:schemeClr val="accent1"/>
+          </a:fillRef>
+          <a:effectRef idx="0">
+            <a:schemeClr val="accent1"/>
+          </a:effectRef>
+          <a:fontRef idx="minor">
+            <a:schemeClr val="tx1"/>
+          </a:fontRef>
+        </p:style>
+      </p:cxnSp>
+      <p:sp>
+        <p:nvSpPr>
+          <p:cNvPr id="20" name="Rectangle 19"/>
+          <p:cNvSpPr/>
+          <p:nvPr/>
+        </p:nvSpPr>
+        <p:spPr>
+          <a:xfrm>
+            <a:off x="2363945" y="2424355"/>
+            <a:ext cx="1354975" cy="567604"/>
+          </a:xfrm>
+          <a:prstGeom prst="rect">
+            <a:avLst/>
+          </a:prstGeom>
+          <a:solidFill>
+            <a:schemeClr val="accent1">
+              <a:lumMod val="50000"/>
+            </a:schemeClr>
+          </a:solidFill>
+          <a:ln>
+            <a:solidFill>
+              <a:schemeClr val="bg1"/>
+            </a:solidFill>
+          </a:ln>
+        </p:spPr>
+        <p:style>
+          <a:lnRef idx="2">
+            <a:schemeClr val="accent1">
+              <a:shade val="50000"/>
+            </a:schemeClr>
+          </a:lnRef>
+          <a:fillRef idx="1">
+            <a:schemeClr val="accent1"/>
+          </a:fillRef>
+          <a:effectRef idx="0">
+            <a:schemeClr val="accent1"/>
+          </a:effectRef>
+          <a:fontRef idx="minor">
+            <a:schemeClr val="lt1"/>
+          </a:fontRef>
+        </p:style>
+        <p:txBody>
+          <a:bodyPr rtlCol="0" anchor="ctr"/>
+          <a:lstStyle/>
+          <a:p>
+            <a:pPr algn="ctr"/>
+            <a:r>
+              <a:rPr lang="en-GB" dirty="0" smtClean="0"/>
+              <a:t>Connect to server</a:t>
+            </a:r>
+            <a:endParaRPr lang="en-GB" dirty="0"/>
+          </a:p>
+        </p:txBody>
+      </p:sp>
+      <p:sp>
+        <p:nvSpPr>
+          <p:cNvPr id="25" name="Rectangle 24"/>
+          <p:cNvSpPr/>
+          <p:nvPr/>
+        </p:nvSpPr>
+        <p:spPr>
+          <a:xfrm>
+            <a:off x="2361864" y="3093075"/>
+            <a:ext cx="1354975" cy="1916364"/>
+          </a:xfrm>
+          <a:prstGeom prst="rect">
+            <a:avLst/>
+          </a:prstGeom>
+          <a:solidFill>
+            <a:schemeClr val="accent1">
+              <a:lumMod val="50000"/>
+            </a:schemeClr>
+          </a:solidFill>
+          <a:ln>
+            <a:solidFill>
+              <a:schemeClr val="bg1"/>
+            </a:solidFill>
+          </a:ln>
+        </p:spPr>
+        <p:style>
+          <a:lnRef idx="2">
+            <a:schemeClr val="accent1">
+              <a:shade val="50000"/>
+            </a:schemeClr>
+          </a:lnRef>
+          <a:fillRef idx="1">
+            <a:schemeClr val="accent1"/>
+          </a:fillRef>
+          <a:effectRef idx="0">
+            <a:schemeClr val="accent1"/>
+          </a:effectRef>
+          <a:fontRef idx="minor">
+            <a:schemeClr val="lt1"/>
+          </a:fontRef>
+        </p:style>
+        <p:txBody>
+          <a:bodyPr rtlCol="0" anchor="t"/>
+          <a:lstStyle/>
+          <a:p>
+            <a:pPr algn="ctr"/>
+            <a:r>
+              <a:rPr lang="en-GB" dirty="0" smtClean="0"/>
+              <a:t>Connected</a:t>
+            </a:r>
+            <a:endParaRPr lang="en-GB" dirty="0"/>
+          </a:p>
+        </p:txBody>
+      </p:sp>
+      <p:sp>
+        <p:nvSpPr>
+          <p:cNvPr id="23" name="Rectangle 22"/>
+          <p:cNvSpPr/>
+          <p:nvPr/>
+        </p:nvSpPr>
+        <p:spPr>
+          <a:xfrm>
+            <a:off x="2571761" y="3552857"/>
+            <a:ext cx="1354975" cy="567604"/>
+          </a:xfrm>
+          <a:prstGeom prst="rect">
+            <a:avLst/>
+          </a:prstGeom>
+          <a:solidFill>
+            <a:schemeClr val="accent1">
+              <a:lumMod val="50000"/>
+            </a:schemeClr>
+          </a:solidFill>
+          <a:ln>
+            <a:solidFill>
+              <a:schemeClr val="bg1"/>
+            </a:solidFill>
+          </a:ln>
+        </p:spPr>
+        <p:style>
+          <a:lnRef idx="2">
+            <a:schemeClr val="accent1">
+              <a:shade val="50000"/>
+            </a:schemeClr>
+          </a:lnRef>
+          <a:fillRef idx="1">
+            <a:schemeClr val="accent1"/>
+          </a:fillRef>
+          <a:effectRef idx="0">
+            <a:schemeClr val="accent1"/>
+          </a:effectRef>
+          <a:fontRef idx="minor">
+            <a:schemeClr val="lt1"/>
+          </a:fontRef>
+        </p:style>
+        <p:txBody>
+          <a:bodyPr rtlCol="0" anchor="ctr"/>
+          <a:lstStyle/>
+          <a:p>
+            <a:pPr algn="ctr"/>
+            <a:r>
+              <a:rPr lang="en-GB" dirty="0" smtClean="0"/>
+              <a:t>Send inputs</a:t>
+            </a:r>
+            <a:endParaRPr lang="en-GB" dirty="0"/>
+          </a:p>
+        </p:txBody>
+      </p:sp>
+      <p:sp>
+        <p:nvSpPr>
+          <p:cNvPr id="24" name="Rectangle 23"/>
+          <p:cNvSpPr/>
+          <p:nvPr/>
+        </p:nvSpPr>
+        <p:spPr>
+          <a:xfrm>
+            <a:off x="2571761" y="4269408"/>
+            <a:ext cx="1354975" cy="567604"/>
+          </a:xfrm>
+          <a:prstGeom prst="rect">
+            <a:avLst/>
+          </a:prstGeom>
+          <a:solidFill>
+            <a:schemeClr val="accent1">
+              <a:lumMod val="50000"/>
+            </a:schemeClr>
+          </a:solidFill>
+          <a:ln>
+            <a:solidFill>
+              <a:schemeClr val="bg1"/>
+            </a:solidFill>
+          </a:ln>
+        </p:spPr>
+        <p:style>
+          <a:lnRef idx="2">
+            <a:schemeClr val="accent1">
+              <a:shade val="50000"/>
+            </a:schemeClr>
+          </a:lnRef>
+          <a:fillRef idx="1">
+            <a:schemeClr val="accent1"/>
+          </a:fillRef>
+          <a:effectRef idx="0">
+            <a:schemeClr val="accent1"/>
+          </a:effectRef>
+          <a:fontRef idx="minor">
+            <a:schemeClr val="lt1"/>
+          </a:fontRef>
+        </p:style>
+        <p:txBody>
+          <a:bodyPr rtlCol="0" anchor="ctr"/>
+          <a:lstStyle/>
+          <a:p>
+            <a:pPr algn="ctr"/>
+            <a:r>
+              <a:rPr lang="en-GB" dirty="0" smtClean="0"/>
+              <a:t>Receive outputs</a:t>
+            </a:r>
+            <a:endParaRPr lang="en-GB" dirty="0"/>
+          </a:p>
+        </p:txBody>
+      </p:sp>
+      <p:sp>
+        <p:nvSpPr>
+          <p:cNvPr id="27" name="Rectangle 26"/>
+          <p:cNvSpPr/>
+          <p:nvPr/>
+        </p:nvSpPr>
+        <p:spPr>
+          <a:xfrm>
+            <a:off x="8296106" y="1992717"/>
+            <a:ext cx="1354975" cy="800359"/>
+          </a:xfrm>
+          <a:prstGeom prst="rect">
+            <a:avLst/>
+          </a:prstGeom>
+          <a:solidFill>
+            <a:schemeClr val="accent1">
+              <a:lumMod val="50000"/>
+            </a:schemeClr>
+          </a:solidFill>
+          <a:ln>
+            <a:solidFill>
+              <a:schemeClr val="bg1"/>
+            </a:solidFill>
+          </a:ln>
+        </p:spPr>
+        <p:style>
+          <a:lnRef idx="2">
+            <a:schemeClr val="accent1">
+              <a:shade val="50000"/>
+            </a:schemeClr>
+          </a:lnRef>
+          <a:fillRef idx="1">
+            <a:schemeClr val="accent1"/>
+          </a:fillRef>
+          <a:effectRef idx="0">
+            <a:schemeClr val="accent1"/>
+          </a:effectRef>
+          <a:fontRef idx="minor">
+            <a:schemeClr val="lt1"/>
+          </a:fontRef>
+        </p:style>
+        <p:txBody>
+          <a:bodyPr rtlCol="0" anchor="ctr"/>
+          <a:lstStyle/>
+          <a:p>
+            <a:pPr algn="ctr"/>
+            <a:r>
+              <a:rPr lang="en-GB" dirty="0" smtClean="0"/>
+              <a:t>Create player and threads</a:t>
+            </a:r>
+            <a:endParaRPr lang="en-GB" dirty="0"/>
+          </a:p>
+        </p:txBody>
+      </p:sp>
+      <p:sp>
+        <p:nvSpPr>
+          <p:cNvPr id="28" name="Rectangle 27"/>
+          <p:cNvSpPr/>
+          <p:nvPr/>
+        </p:nvSpPr>
+        <p:spPr>
+          <a:xfrm>
+            <a:off x="10125936" y="1992718"/>
+            <a:ext cx="1354975" cy="4183638"/>
+          </a:xfrm>
+          <a:prstGeom prst="rect">
+            <a:avLst/>
+          </a:prstGeom>
+          <a:solidFill>
+            <a:schemeClr val="accent1">
+              <a:lumMod val="50000"/>
+            </a:schemeClr>
+          </a:solidFill>
+          <a:ln>
+            <a:solidFill>
+              <a:schemeClr val="bg1"/>
+            </a:solidFill>
+          </a:ln>
+        </p:spPr>
+        <p:style>
+          <a:lnRef idx="2">
+            <a:schemeClr val="accent1">
+              <a:shade val="50000"/>
+            </a:schemeClr>
+          </a:lnRef>
+          <a:fillRef idx="1">
+            <a:schemeClr val="accent1"/>
+          </a:fillRef>
+          <a:effectRef idx="0">
+            <a:schemeClr val="accent1"/>
+          </a:effectRef>
+          <a:fontRef idx="minor">
+            <a:schemeClr val="lt1"/>
+          </a:fontRef>
+        </p:style>
+        <p:txBody>
+          <a:bodyPr rtlCol="0" anchor="ctr"/>
+          <a:lstStyle/>
+          <a:p>
+            <a:pPr algn="ctr"/>
+            <a:r>
+              <a:rPr lang="en-GB" dirty="0" smtClean="0"/>
+              <a:t>Game loop</a:t>
+            </a:r>
+            <a:endParaRPr lang="en-GB" dirty="0"/>
+          </a:p>
+        </p:txBody>
+      </p:sp>
+      <p:cxnSp>
+        <p:nvCxnSpPr>
+          <p:cNvPr id="29" name="Straight Arrow Connector 28"/>
+          <p:cNvCxnSpPr/>
+          <p:nvPr/>
+        </p:nvCxnSpPr>
+        <p:spPr>
+          <a:xfrm>
+            <a:off x="3945930" y="3836659"/>
+            <a:ext cx="663481" cy="0"/>
+          </a:xfrm>
+          <a:prstGeom prst="straightConnector1">
+            <a:avLst/>
+          </a:prstGeom>
+          <a:ln w="38100">
+            <a:solidFill>
+              <a:schemeClr val="tx1"/>
+            </a:solidFill>
+            <a:tailEnd type="triangle"/>
+          </a:ln>
+        </p:spPr>
+        <p:style>
+          <a:lnRef idx="1">
+            <a:schemeClr val="accent1"/>
+          </a:lnRef>
+          <a:fillRef idx="0">
+            <a:schemeClr val="accent1"/>
+          </a:fillRef>
+          <a:effectRef idx="0">
+            <a:schemeClr val="accent1"/>
+          </a:effectRef>
+          <a:fontRef idx="minor">
+            <a:schemeClr val="tx1"/>
+          </a:fontRef>
+        </p:style>
+      </p:cxnSp>
+      <p:sp>
+        <p:nvSpPr>
+          <p:cNvPr id="32" name="Rectangle 31"/>
+          <p:cNvSpPr/>
+          <p:nvPr/>
+        </p:nvSpPr>
+        <p:spPr>
+          <a:xfrm>
+            <a:off x="4609411" y="2605961"/>
+            <a:ext cx="1403809" cy="1612538"/>
+          </a:xfrm>
+          <a:prstGeom prst="rect">
+            <a:avLst/>
+          </a:prstGeom>
+          <a:solidFill>
+            <a:schemeClr val="accent1">
+              <a:lumMod val="50000"/>
+            </a:schemeClr>
+          </a:solidFill>
+          <a:ln>
+            <a:solidFill>
+              <a:schemeClr val="bg1"/>
+            </a:solidFill>
+          </a:ln>
+        </p:spPr>
+        <p:style>
+          <a:lnRef idx="2">
+            <a:schemeClr val="accent1">
+              <a:shade val="50000"/>
+            </a:schemeClr>
+          </a:lnRef>
+          <a:fillRef idx="1">
+            <a:schemeClr val="accent1"/>
+          </a:fillRef>
+          <a:effectRef idx="0">
+            <a:schemeClr val="accent1"/>
+          </a:effectRef>
+          <a:fontRef idx="minor">
+            <a:schemeClr val="lt1"/>
+          </a:fontRef>
+        </p:style>
+        <p:txBody>
+          <a:bodyPr rtlCol="0" anchor="ctr"/>
+          <a:lstStyle/>
+          <a:p>
+            <a:pPr algn="ctr"/>
+            <a:r>
+              <a:rPr lang="en-GB" dirty="0" smtClean="0"/>
+              <a:t>Receive player inputs</a:t>
+            </a:r>
+            <a:endParaRPr lang="en-GB" dirty="0"/>
+          </a:p>
+        </p:txBody>
+      </p:sp>
+      <p:cxnSp>
+        <p:nvCxnSpPr>
+          <p:cNvPr id="33" name="Straight Arrow Connector 32"/>
+          <p:cNvCxnSpPr/>
+          <p:nvPr/>
+        </p:nvCxnSpPr>
+        <p:spPr>
+          <a:xfrm>
+            <a:off x="6013220" y="2991960"/>
+            <a:ext cx="3927377" cy="3197"/>
+          </a:xfrm>
+          <a:prstGeom prst="straightConnector1">
+            <a:avLst/>
+          </a:prstGeom>
+          <a:ln w="38100">
+            <a:solidFill>
+              <a:schemeClr val="tx1"/>
+            </a:solidFill>
+            <a:tailEnd type="triangle"/>
+          </a:ln>
+        </p:spPr>
+        <p:style>
+          <a:lnRef idx="1">
+            <a:schemeClr val="accent1"/>
+          </a:lnRef>
+          <a:fillRef idx="0">
+            <a:schemeClr val="accent1"/>
+          </a:fillRef>
+          <a:effectRef idx="0">
+            <a:schemeClr val="accent1"/>
+          </a:effectRef>
+          <a:fontRef idx="minor">
+            <a:schemeClr val="tx1"/>
+          </a:fontRef>
+        </p:style>
+      </p:cxnSp>
+      <p:sp>
+        <p:nvSpPr>
+          <p:cNvPr id="35" name="Rectangle 34"/>
+          <p:cNvSpPr/>
+          <p:nvPr/>
+        </p:nvSpPr>
+        <p:spPr>
+          <a:xfrm>
+            <a:off x="6427818" y="3266692"/>
+            <a:ext cx="1413164" cy="1604357"/>
+          </a:xfrm>
+          <a:prstGeom prst="rect">
+            <a:avLst/>
+          </a:prstGeom>
+          <a:solidFill>
+            <a:schemeClr val="accent1">
+              <a:lumMod val="50000"/>
+            </a:schemeClr>
+          </a:solidFill>
+          <a:ln>
+            <a:solidFill>
+              <a:schemeClr val="bg1"/>
+            </a:solidFill>
+          </a:ln>
+        </p:spPr>
+        <p:style>
+          <a:lnRef idx="2">
+            <a:schemeClr val="accent1">
+              <a:shade val="50000"/>
+            </a:schemeClr>
+          </a:lnRef>
+          <a:fillRef idx="1">
+            <a:schemeClr val="accent1"/>
+          </a:fillRef>
+          <a:effectRef idx="0">
+            <a:schemeClr val="accent1"/>
+          </a:effectRef>
+          <a:fontRef idx="minor">
+            <a:schemeClr val="lt1"/>
+          </a:fontRef>
+        </p:style>
+        <p:txBody>
+          <a:bodyPr rtlCol="0" anchor="ctr"/>
+          <a:lstStyle/>
+          <a:p>
+            <a:pPr algn="ctr"/>
+            <a:r>
+              <a:rPr lang="en-GB" dirty="0" smtClean="0"/>
+              <a:t>Send player outputs</a:t>
+            </a:r>
+            <a:endParaRPr lang="en-GB" dirty="0"/>
+          </a:p>
+        </p:txBody>
+      </p:sp>
+      <p:sp>
+        <p:nvSpPr>
+          <p:cNvPr id="41" name="Rectangle 40"/>
+          <p:cNvSpPr/>
+          <p:nvPr/>
+        </p:nvSpPr>
+        <p:spPr>
+          <a:xfrm>
+            <a:off x="2313018" y="5436237"/>
+            <a:ext cx="1465119" cy="449157"/>
+          </a:xfrm>
+          <a:prstGeom prst="rect">
+            <a:avLst/>
+          </a:prstGeom>
+          <a:solidFill>
+            <a:schemeClr val="accent1">
+              <a:lumMod val="50000"/>
+            </a:schemeClr>
+          </a:solidFill>
+          <a:ln>
+            <a:solidFill>
+              <a:schemeClr val="bg1"/>
+            </a:solidFill>
+          </a:ln>
+        </p:spPr>
+        <p:style>
+          <a:lnRef idx="2">
+            <a:schemeClr val="accent1">
+              <a:shade val="50000"/>
+            </a:schemeClr>
+          </a:lnRef>
+          <a:fillRef idx="1">
+            <a:schemeClr val="accent1"/>
+          </a:fillRef>
+          <a:effectRef idx="0">
+            <a:schemeClr val="accent1"/>
+          </a:effectRef>
+          <a:fontRef idx="minor">
+            <a:schemeClr val="lt1"/>
+          </a:fontRef>
+        </p:style>
+        <p:txBody>
+          <a:bodyPr rtlCol="0" anchor="t"/>
+          <a:lstStyle/>
+          <a:p>
+            <a:pPr algn="ctr"/>
+            <a:r>
+              <a:rPr lang="en-GB" dirty="0" smtClean="0"/>
+              <a:t>Disconnected</a:t>
+            </a:r>
+            <a:endParaRPr lang="en-GB" dirty="0"/>
+          </a:p>
+        </p:txBody>
+      </p:sp>
+      <p:cxnSp>
+        <p:nvCxnSpPr>
+          <p:cNvPr id="43" name="Straight Arrow Connector 42"/>
+          <p:cNvCxnSpPr/>
+          <p:nvPr/>
+        </p:nvCxnSpPr>
+        <p:spPr>
+          <a:xfrm flipH="1" flipV="1">
+            <a:off x="7824356" y="4596938"/>
+            <a:ext cx="1998691" cy="12259"/>
+          </a:xfrm>
+          <a:prstGeom prst="straightConnector1">
+            <a:avLst/>
+          </a:prstGeom>
+          <a:ln w="38100">
+            <a:solidFill>
+              <a:schemeClr val="tx1"/>
+            </a:solidFill>
+            <a:tailEnd type="triangle"/>
+          </a:ln>
+        </p:spPr>
+        <p:style>
+          <a:lnRef idx="1">
+            <a:schemeClr val="accent1"/>
+          </a:lnRef>
+          <a:fillRef idx="0">
+            <a:schemeClr val="accent1"/>
+          </a:fillRef>
+          <a:effectRef idx="0">
+            <a:schemeClr val="accent1"/>
+          </a:effectRef>
+          <a:fontRef idx="minor">
+            <a:schemeClr val="tx1"/>
+          </a:fontRef>
+        </p:style>
+      </p:cxnSp>
+      <p:sp>
+        <p:nvSpPr>
+          <p:cNvPr id="46" name="Rectangle 45"/>
+          <p:cNvSpPr/>
+          <p:nvPr/>
+        </p:nvSpPr>
+        <p:spPr>
+          <a:xfrm>
+            <a:off x="10002808" y="2922244"/>
+            <a:ext cx="1354975" cy="806269"/>
+          </a:xfrm>
+          <a:prstGeom prst="rect">
+            <a:avLst/>
+          </a:prstGeom>
+          <a:solidFill>
+            <a:schemeClr val="accent1">
+              <a:lumMod val="50000"/>
+            </a:schemeClr>
+          </a:solidFill>
+          <a:ln>
+            <a:solidFill>
+              <a:schemeClr val="bg1"/>
+            </a:solidFill>
+          </a:ln>
+        </p:spPr>
+        <p:style>
+          <a:lnRef idx="2">
+            <a:schemeClr val="accent1">
+              <a:shade val="50000"/>
+            </a:schemeClr>
+          </a:lnRef>
+          <a:fillRef idx="1">
+            <a:schemeClr val="accent1"/>
+          </a:fillRef>
+          <a:effectRef idx="0">
+            <a:schemeClr val="accent1"/>
+          </a:effectRef>
+          <a:fontRef idx="minor">
+            <a:schemeClr val="lt1"/>
+          </a:fontRef>
+        </p:style>
+        <p:txBody>
+          <a:bodyPr rtlCol="0" anchor="ctr"/>
+          <a:lstStyle/>
+          <a:p>
+            <a:pPr algn="ctr"/>
+            <a:r>
+              <a:rPr lang="en-GB" dirty="0" smtClean="0"/>
+              <a:t>Process player commands</a:t>
+            </a:r>
+            <a:endParaRPr lang="en-GB" dirty="0"/>
+          </a:p>
+        </p:txBody>
+      </p:sp>
+      <p:cxnSp>
+        <p:nvCxnSpPr>
+          <p:cNvPr id="49" name="Straight Arrow Connector 48"/>
           <p:cNvCxnSpPr>
-            <a:stCxn id="20" idx="2"/>
-            <a:endCxn id="25" idx="0"/>
+            <a:endCxn id="24" idx="3"/>
           </p:cNvCxnSpPr>
           <p:nvPr/>
         </p:nvCxnSpPr>
         <p:spPr>
-          <a:xfrm flipH="1">
-            <a:off x="2615400" y="2426693"/>
-            <a:ext cx="2081" cy="101115"/>
-          </a:xfrm>
-          <a:prstGeom prst="line">
+          <a:xfrm flipH="1" flipV="1">
+            <a:off x="3926736" y="4553210"/>
+            <a:ext cx="2497440" cy="5396"/>
+          </a:xfrm>
+          <a:prstGeom prst="straightConnector1">
             <a:avLst/>
           </a:prstGeom>
+          <a:ln w="38100">
+            <a:solidFill>
+              <a:schemeClr val="tx1"/>
+            </a:solidFill>
+            <a:tailEnd type="triangle"/>
+          </a:ln>
         </p:spPr>
         <p:style>
-          <a:lnRef idx="3">
-            <a:schemeClr val="dk1"/>
+          <a:lnRef idx="1">
+            <a:schemeClr val="accent1"/>
           </a:lnRef>
           <a:fillRef idx="0">
-            <a:schemeClr val="dk1"/>
+            <a:schemeClr val="accent1"/>
           </a:fillRef>
-          <a:effectRef idx="2">
-            <a:schemeClr val="dk1"/>
+          <a:effectRef idx="0">
+            <a:schemeClr val="accent1"/>
+          </a:effectRef>
+          <a:fontRef idx="minor">
+            <a:schemeClr val="tx1"/>
+          </a:fontRef>
+        </p:style>
+      </p:cxnSp>
+      <p:sp>
+        <p:nvSpPr>
+          <p:cNvPr id="54" name="TextBox 53"/>
+          <p:cNvSpPr txBox="1"/>
+          <p:nvPr/>
+        </p:nvSpPr>
+        <p:spPr>
+          <a:xfrm>
+            <a:off x="2219233" y="1608544"/>
+            <a:ext cx="1726697" cy="369332"/>
+          </a:xfrm>
+          <a:prstGeom prst="rect">
+            <a:avLst/>
+          </a:prstGeom>
+          <a:noFill/>
+        </p:spPr>
+        <p:txBody>
+          <a:bodyPr wrap="square" rtlCol="0">
+            <a:spAutoFit/>
+          </a:bodyPr>
+          <a:lstStyle/>
+          <a:p>
+            <a:pPr algn="ctr"/>
+            <a:r>
+              <a:rPr lang="en-GB" dirty="0" smtClean="0"/>
+              <a:t>Main Threads</a:t>
+            </a:r>
+            <a:endParaRPr lang="en-GB" dirty="0"/>
+          </a:p>
+        </p:txBody>
+      </p:sp>
+      <p:sp>
+        <p:nvSpPr>
+          <p:cNvPr id="61" name="Rectangle 60"/>
+          <p:cNvSpPr/>
+          <p:nvPr/>
+        </p:nvSpPr>
+        <p:spPr>
+          <a:xfrm>
+            <a:off x="9980984" y="4400262"/>
+            <a:ext cx="1354975" cy="806269"/>
+          </a:xfrm>
+          <a:prstGeom prst="rect">
+            <a:avLst/>
+          </a:prstGeom>
+          <a:solidFill>
+            <a:schemeClr val="accent1">
+              <a:lumMod val="50000"/>
+            </a:schemeClr>
+          </a:solidFill>
+          <a:ln>
+            <a:solidFill>
+              <a:schemeClr val="bg1"/>
+            </a:solidFill>
+          </a:ln>
+        </p:spPr>
+        <p:style>
+          <a:lnRef idx="2">
+            <a:schemeClr val="accent1">
+              <a:shade val="50000"/>
+            </a:schemeClr>
+          </a:lnRef>
+          <a:fillRef idx="1">
+            <a:schemeClr val="accent1"/>
+          </a:fillRef>
+          <a:effectRef idx="0">
+            <a:schemeClr val="accent1"/>
+          </a:effectRef>
+          <a:fontRef idx="minor">
+            <a:schemeClr val="lt1"/>
+          </a:fontRef>
+        </p:style>
+        <p:txBody>
+          <a:bodyPr rtlCol="0" anchor="ctr"/>
+          <a:lstStyle/>
+          <a:p>
+            <a:pPr algn="ctr"/>
+            <a:r>
+              <a:rPr lang="en-GB" dirty="0" smtClean="0"/>
+              <a:t>Game outputs</a:t>
+            </a:r>
+            <a:endParaRPr lang="en-GB" dirty="0"/>
+          </a:p>
+        </p:txBody>
+      </p:sp>
+      <p:cxnSp>
+        <p:nvCxnSpPr>
+          <p:cNvPr id="63" name="Straight Arrow Connector 62"/>
+          <p:cNvCxnSpPr>
+            <a:stCxn id="41" idx="3"/>
+          </p:cNvCxnSpPr>
+          <p:nvPr/>
+        </p:nvCxnSpPr>
+        <p:spPr>
+          <a:xfrm flipV="1">
+            <a:off x="3778137" y="5636030"/>
+            <a:ext cx="6352482" cy="24786"/>
+          </a:xfrm>
+          <a:prstGeom prst="straightConnector1">
+            <a:avLst/>
+          </a:prstGeom>
+          <a:ln w="38100">
+            <a:solidFill>
+              <a:schemeClr val="tx1"/>
+            </a:solidFill>
+            <a:tailEnd type="triangle"/>
+          </a:ln>
+        </p:spPr>
+        <p:style>
+          <a:lnRef idx="1">
+            <a:schemeClr val="accent1"/>
+          </a:lnRef>
+          <a:fillRef idx="0">
+            <a:schemeClr val="accent1"/>
+          </a:fillRef>
+          <a:effectRef idx="0">
+            <a:schemeClr val="accent1"/>
+          </a:effectRef>
+          <a:fontRef idx="minor">
+            <a:schemeClr val="tx1"/>
+          </a:fontRef>
+        </p:style>
+      </p:cxnSp>
+      <p:sp>
+        <p:nvSpPr>
+          <p:cNvPr id="66" name="Rectangle 65"/>
+          <p:cNvSpPr/>
+          <p:nvPr/>
+        </p:nvSpPr>
+        <p:spPr>
+          <a:xfrm>
+            <a:off x="9980983" y="5289470"/>
+            <a:ext cx="1354975" cy="806269"/>
+          </a:xfrm>
+          <a:prstGeom prst="rect">
+            <a:avLst/>
+          </a:prstGeom>
+          <a:solidFill>
+            <a:schemeClr val="accent1">
+              <a:lumMod val="50000"/>
+            </a:schemeClr>
+          </a:solidFill>
+          <a:ln>
+            <a:solidFill>
+              <a:schemeClr val="bg1"/>
+            </a:solidFill>
+          </a:ln>
+        </p:spPr>
+        <p:style>
+          <a:lnRef idx="2">
+            <a:schemeClr val="accent1">
+              <a:shade val="50000"/>
+            </a:schemeClr>
+          </a:lnRef>
+          <a:fillRef idx="1">
+            <a:schemeClr val="accent1"/>
+          </a:fillRef>
+          <a:effectRef idx="0">
+            <a:schemeClr val="accent1"/>
+          </a:effectRef>
+          <a:fontRef idx="minor">
+            <a:schemeClr val="lt1"/>
+          </a:fontRef>
+        </p:style>
+        <p:txBody>
+          <a:bodyPr rtlCol="0" anchor="ctr"/>
+          <a:lstStyle/>
+          <a:p>
+            <a:pPr algn="ctr"/>
+            <a:r>
+              <a:rPr lang="en-GB" dirty="0" smtClean="0"/>
+              <a:t>Flag player for removal</a:t>
+            </a:r>
+            <a:endParaRPr lang="en-GB" dirty="0"/>
+          </a:p>
+        </p:txBody>
+      </p:sp>
+      <p:sp>
+        <p:nvSpPr>
+          <p:cNvPr id="68" name="Rectangle 67"/>
+          <p:cNvSpPr/>
+          <p:nvPr/>
+        </p:nvSpPr>
+        <p:spPr>
+          <a:xfrm>
+            <a:off x="9997609" y="2059222"/>
+            <a:ext cx="1354975" cy="806269"/>
+          </a:xfrm>
+          <a:prstGeom prst="rect">
+            <a:avLst/>
+          </a:prstGeom>
+          <a:solidFill>
+            <a:schemeClr val="accent1">
+              <a:lumMod val="50000"/>
+            </a:schemeClr>
+          </a:solidFill>
+          <a:ln>
+            <a:solidFill>
+              <a:schemeClr val="bg1"/>
+            </a:solidFill>
+          </a:ln>
+        </p:spPr>
+        <p:style>
+          <a:lnRef idx="2">
+            <a:schemeClr val="accent1">
+              <a:shade val="50000"/>
+            </a:schemeClr>
+          </a:lnRef>
+          <a:fillRef idx="1">
+            <a:schemeClr val="accent1"/>
+          </a:fillRef>
+          <a:effectRef idx="0">
+            <a:schemeClr val="accent1"/>
+          </a:effectRef>
+          <a:fontRef idx="minor">
+            <a:schemeClr val="lt1"/>
+          </a:fontRef>
+        </p:style>
+        <p:txBody>
+          <a:bodyPr rtlCol="0" anchor="ctr"/>
+          <a:lstStyle/>
+          <a:p>
+            <a:pPr algn="ctr"/>
+            <a:r>
+              <a:rPr lang="en-GB" dirty="0" smtClean="0"/>
+              <a:t>(Remove </a:t>
+            </a:r>
+            <a:r>
+              <a:rPr lang="en-GB" dirty="0" smtClean="0"/>
+              <a:t>flagged </a:t>
+            </a:r>
+            <a:r>
+              <a:rPr lang="en-GB" dirty="0" smtClean="0"/>
+              <a:t>players)</a:t>
+            </a:r>
+            <a:endParaRPr lang="en-GB" dirty="0"/>
+          </a:p>
+        </p:txBody>
+      </p:sp>
+      <p:sp>
+        <p:nvSpPr>
+          <p:cNvPr id="70" name="TextBox 69"/>
+          <p:cNvSpPr txBox="1"/>
+          <p:nvPr/>
+        </p:nvSpPr>
+        <p:spPr>
+          <a:xfrm>
+            <a:off x="452524" y="1631146"/>
+            <a:ext cx="1715791" cy="369332"/>
+          </a:xfrm>
+          <a:prstGeom prst="rect">
+            <a:avLst/>
+          </a:prstGeom>
+          <a:noFill/>
+        </p:spPr>
+        <p:txBody>
+          <a:bodyPr wrap="square" rtlCol="0">
+            <a:spAutoFit/>
+          </a:bodyPr>
+          <a:lstStyle/>
+          <a:p>
+            <a:pPr algn="ctr"/>
+            <a:r>
+              <a:rPr lang="en-GB" dirty="0" smtClean="0"/>
+              <a:t>UI Thread</a:t>
+            </a:r>
+            <a:endParaRPr lang="en-GB" dirty="0"/>
+          </a:p>
+        </p:txBody>
+      </p:sp>
+      <p:sp>
+        <p:nvSpPr>
+          <p:cNvPr id="71" name="Rectangle 70"/>
+          <p:cNvSpPr/>
+          <p:nvPr/>
+        </p:nvSpPr>
+        <p:spPr>
+          <a:xfrm>
+            <a:off x="612558" y="2424355"/>
+            <a:ext cx="1354975" cy="567604"/>
+          </a:xfrm>
+          <a:prstGeom prst="rect">
+            <a:avLst/>
+          </a:prstGeom>
+          <a:solidFill>
+            <a:schemeClr val="accent1">
+              <a:lumMod val="50000"/>
+            </a:schemeClr>
+          </a:solidFill>
+          <a:ln>
+            <a:solidFill>
+              <a:schemeClr val="bg1"/>
+            </a:solidFill>
+          </a:ln>
+        </p:spPr>
+        <p:style>
+          <a:lnRef idx="2">
+            <a:schemeClr val="accent1">
+              <a:shade val="50000"/>
+            </a:schemeClr>
+          </a:lnRef>
+          <a:fillRef idx="1">
+            <a:schemeClr val="accent1"/>
+          </a:fillRef>
+          <a:effectRef idx="0">
+            <a:schemeClr val="accent1"/>
+          </a:effectRef>
+          <a:fontRef idx="minor">
+            <a:schemeClr val="lt1"/>
+          </a:fontRef>
+        </p:style>
+        <p:txBody>
+          <a:bodyPr rtlCol="0" anchor="ctr"/>
+          <a:lstStyle/>
+          <a:p>
+            <a:pPr algn="ctr"/>
+            <a:r>
+              <a:rPr lang="en-GB" dirty="0" smtClean="0"/>
+              <a:t>Inform of status</a:t>
+            </a:r>
+            <a:endParaRPr lang="en-GB" dirty="0"/>
+          </a:p>
+        </p:txBody>
+      </p:sp>
+      <p:cxnSp>
+        <p:nvCxnSpPr>
+          <p:cNvPr id="72" name="Straight Arrow Connector 71"/>
+          <p:cNvCxnSpPr>
+            <a:endCxn id="71" idx="3"/>
+          </p:cNvCxnSpPr>
+          <p:nvPr/>
+        </p:nvCxnSpPr>
+        <p:spPr>
+          <a:xfrm flipH="1">
+            <a:off x="1967533" y="2707692"/>
+            <a:ext cx="356158" cy="465"/>
+          </a:xfrm>
+          <a:prstGeom prst="straightConnector1">
+            <a:avLst/>
+          </a:prstGeom>
+          <a:ln w="38100">
+            <a:solidFill>
+              <a:schemeClr val="tx1"/>
+            </a:solidFill>
+            <a:tailEnd type="triangle"/>
+          </a:ln>
+        </p:spPr>
+        <p:style>
+          <a:lnRef idx="1">
+            <a:schemeClr val="accent1"/>
+          </a:lnRef>
+          <a:fillRef idx="0">
+            <a:schemeClr val="accent1"/>
+          </a:fillRef>
+          <a:effectRef idx="0">
+            <a:schemeClr val="accent1"/>
+          </a:effectRef>
+          <a:fontRef idx="minor">
+            <a:schemeClr val="tx1"/>
+          </a:fontRef>
+        </p:style>
+      </p:cxnSp>
+      <p:sp>
+        <p:nvSpPr>
+          <p:cNvPr id="75" name="Rectangle 74"/>
+          <p:cNvSpPr/>
+          <p:nvPr/>
+        </p:nvSpPr>
+        <p:spPr>
+          <a:xfrm>
+            <a:off x="648919" y="4251891"/>
+            <a:ext cx="1354975" cy="586658"/>
+          </a:xfrm>
+          <a:prstGeom prst="rect">
+            <a:avLst/>
+          </a:prstGeom>
+          <a:solidFill>
+            <a:schemeClr val="accent1">
+              <a:lumMod val="50000"/>
+            </a:schemeClr>
+          </a:solidFill>
+          <a:ln>
+            <a:solidFill>
+              <a:schemeClr val="bg1"/>
+            </a:solidFill>
+          </a:ln>
+        </p:spPr>
+        <p:style>
+          <a:lnRef idx="2">
+            <a:schemeClr val="accent1">
+              <a:shade val="50000"/>
+            </a:schemeClr>
+          </a:lnRef>
+          <a:fillRef idx="1">
+            <a:schemeClr val="accent1"/>
+          </a:fillRef>
+          <a:effectRef idx="0">
+            <a:schemeClr val="accent1"/>
+          </a:effectRef>
+          <a:fontRef idx="minor">
+            <a:schemeClr val="lt1"/>
+          </a:fontRef>
+        </p:style>
+        <p:txBody>
+          <a:bodyPr rtlCol="0" anchor="ctr"/>
+          <a:lstStyle/>
+          <a:p>
+            <a:pPr algn="ctr"/>
+            <a:r>
+              <a:rPr lang="en-GB" dirty="0" smtClean="0"/>
+              <a:t>Add to output box</a:t>
+            </a:r>
+            <a:endParaRPr lang="en-GB" dirty="0"/>
+          </a:p>
+        </p:txBody>
+      </p:sp>
+      <p:sp>
+        <p:nvSpPr>
+          <p:cNvPr id="77" name="Rectangle 76"/>
+          <p:cNvSpPr/>
+          <p:nvPr/>
+        </p:nvSpPr>
+        <p:spPr>
+          <a:xfrm>
+            <a:off x="648906" y="3503034"/>
+            <a:ext cx="1354975" cy="574149"/>
+          </a:xfrm>
+          <a:prstGeom prst="rect">
+            <a:avLst/>
+          </a:prstGeom>
+          <a:solidFill>
+            <a:schemeClr val="accent1">
+              <a:lumMod val="50000"/>
+            </a:schemeClr>
+          </a:solidFill>
+          <a:ln>
+            <a:solidFill>
+              <a:schemeClr val="bg1"/>
+            </a:solidFill>
+          </a:ln>
+        </p:spPr>
+        <p:style>
+          <a:lnRef idx="2">
+            <a:schemeClr val="accent1">
+              <a:shade val="50000"/>
+            </a:schemeClr>
+          </a:lnRef>
+          <a:fillRef idx="1">
+            <a:schemeClr val="accent1"/>
+          </a:fillRef>
+          <a:effectRef idx="0">
+            <a:schemeClr val="accent1"/>
+          </a:effectRef>
+          <a:fontRef idx="minor">
+            <a:schemeClr val="lt1"/>
+          </a:fontRef>
+        </p:style>
+        <p:txBody>
+          <a:bodyPr rtlCol="0" anchor="ctr"/>
+          <a:lstStyle/>
+          <a:p>
+            <a:pPr algn="ctr"/>
+            <a:r>
+              <a:rPr lang="en-GB" dirty="0" smtClean="0"/>
+              <a:t>Submitting input box</a:t>
+            </a:r>
+            <a:endParaRPr lang="en-GB" dirty="0"/>
+          </a:p>
+        </p:txBody>
+      </p:sp>
+      <p:cxnSp>
+        <p:nvCxnSpPr>
+          <p:cNvPr id="78" name="Straight Arrow Connector 77"/>
+          <p:cNvCxnSpPr/>
+          <p:nvPr/>
+        </p:nvCxnSpPr>
+        <p:spPr>
+          <a:xfrm>
+            <a:off x="2017141" y="3836659"/>
+            <a:ext cx="553842" cy="0"/>
+          </a:xfrm>
+          <a:prstGeom prst="straightConnector1">
+            <a:avLst/>
+          </a:prstGeom>
+          <a:ln w="38100">
+            <a:solidFill>
+              <a:schemeClr val="tx1"/>
+            </a:solidFill>
+            <a:tailEnd type="triangle"/>
+          </a:ln>
+        </p:spPr>
+        <p:style>
+          <a:lnRef idx="1">
+            <a:schemeClr val="accent1"/>
+          </a:lnRef>
+          <a:fillRef idx="0">
+            <a:schemeClr val="accent1"/>
+          </a:fillRef>
+          <a:effectRef idx="0">
+            <a:schemeClr val="accent1"/>
           </a:effectRef>
           <a:fontRef idx="minor">
             <a:schemeClr val="tx1"/>
@@ -4739,37 +4752,222 @@
       </p:cxnSp>
       <p:cxnSp>
         <p:nvCxnSpPr>
-          <p:cNvPr id="109" name="Straight Connector 108"/>
+          <p:cNvPr id="83" name="Straight Arrow Connector 82"/>
           <p:cNvCxnSpPr>
-            <a:stCxn id="25" idx="2"/>
-            <a:endCxn id="41" idx="0"/>
+            <a:endCxn id="75" idx="3"/>
           </p:cNvCxnSpPr>
           <p:nvPr/>
         </p:nvCxnSpPr>
         <p:spPr>
-          <a:xfrm>
-            <a:off x="2615400" y="4630425"/>
-            <a:ext cx="6226" cy="240546"/>
-          </a:xfrm>
-          <a:prstGeom prst="line">
+          <a:xfrm flipH="1" flipV="1">
+            <a:off x="2003894" y="4545220"/>
+            <a:ext cx="535138" cy="7990"/>
+          </a:xfrm>
+          <a:prstGeom prst="straightConnector1">
             <a:avLst/>
           </a:prstGeom>
+          <a:ln w="38100">
+            <a:solidFill>
+              <a:schemeClr val="tx1"/>
+            </a:solidFill>
+            <a:tailEnd type="triangle"/>
+          </a:ln>
         </p:spPr>
         <p:style>
-          <a:lnRef idx="3">
-            <a:schemeClr val="dk1"/>
+          <a:lnRef idx="1">
+            <a:schemeClr val="accent1"/>
           </a:lnRef>
           <a:fillRef idx="0">
-            <a:schemeClr val="dk1"/>
+            <a:schemeClr val="accent1"/>
           </a:fillRef>
-          <a:effectRef idx="2">
-            <a:schemeClr val="dk1"/>
+          <a:effectRef idx="0">
+            <a:schemeClr val="accent1"/>
           </a:effectRef>
           <a:fontRef idx="minor">
             <a:schemeClr val="tx1"/>
           </a:fontRef>
         </p:style>
       </p:cxnSp>
+      <p:sp>
+        <p:nvSpPr>
+          <p:cNvPr id="86" name="Rectangle 85"/>
+          <p:cNvSpPr/>
+          <p:nvPr/>
+        </p:nvSpPr>
+        <p:spPr>
+          <a:xfrm>
+            <a:off x="552022" y="5339348"/>
+            <a:ext cx="1465119" cy="583221"/>
+          </a:xfrm>
+          <a:prstGeom prst="rect">
+            <a:avLst/>
+          </a:prstGeom>
+          <a:solidFill>
+            <a:schemeClr val="accent1">
+              <a:lumMod val="50000"/>
+            </a:schemeClr>
+          </a:solidFill>
+          <a:ln>
+            <a:solidFill>
+              <a:schemeClr val="bg1"/>
+            </a:solidFill>
+          </a:ln>
+        </p:spPr>
+        <p:style>
+          <a:lnRef idx="2">
+            <a:schemeClr val="accent1">
+              <a:shade val="50000"/>
+            </a:schemeClr>
+          </a:lnRef>
+          <a:fillRef idx="1">
+            <a:schemeClr val="accent1"/>
+          </a:fillRef>
+          <a:effectRef idx="0">
+            <a:schemeClr val="accent1"/>
+          </a:effectRef>
+          <a:fontRef idx="minor">
+            <a:schemeClr val="lt1"/>
+          </a:fontRef>
+        </p:style>
+        <p:txBody>
+          <a:bodyPr rtlCol="0" anchor="t"/>
+          <a:lstStyle/>
+          <a:p>
+            <a:pPr algn="ctr"/>
+            <a:r>
+              <a:rPr lang="en-GB" dirty="0" smtClean="0"/>
+              <a:t>Close window</a:t>
+            </a:r>
+            <a:endParaRPr lang="en-GB" dirty="0"/>
+          </a:p>
+        </p:txBody>
+      </p:sp>
+      <p:cxnSp>
+        <p:nvCxnSpPr>
+          <p:cNvPr id="88" name="Straight Arrow Connector 87"/>
+          <p:cNvCxnSpPr/>
+          <p:nvPr/>
+        </p:nvCxnSpPr>
+        <p:spPr>
+          <a:xfrm flipH="1">
+            <a:off x="2003881" y="5486685"/>
+            <a:ext cx="277438" cy="1"/>
+          </a:xfrm>
+          <a:prstGeom prst="straightConnector1">
+            <a:avLst/>
+          </a:prstGeom>
+          <a:ln w="38100">
+            <a:solidFill>
+              <a:schemeClr val="tx1"/>
+            </a:solidFill>
+            <a:tailEnd type="triangle"/>
+          </a:ln>
+        </p:spPr>
+        <p:style>
+          <a:lnRef idx="1">
+            <a:schemeClr val="accent1"/>
+          </a:lnRef>
+          <a:fillRef idx="0">
+            <a:schemeClr val="accent1"/>
+          </a:fillRef>
+          <a:effectRef idx="0">
+            <a:schemeClr val="accent1"/>
+          </a:effectRef>
+          <a:fontRef idx="minor">
+            <a:schemeClr val="tx1"/>
+          </a:fontRef>
+        </p:style>
+      </p:cxnSp>
+      <p:cxnSp>
+        <p:nvCxnSpPr>
+          <p:cNvPr id="91" name="Straight Arrow Connector 90"/>
+          <p:cNvCxnSpPr/>
+          <p:nvPr/>
+        </p:nvCxnSpPr>
+        <p:spPr>
+          <a:xfrm>
+            <a:off x="2052546" y="5780419"/>
+            <a:ext cx="282459" cy="7400"/>
+          </a:xfrm>
+          <a:prstGeom prst="straightConnector1">
+            <a:avLst/>
+          </a:prstGeom>
+          <a:ln w="38100">
+            <a:solidFill>
+              <a:schemeClr val="tx1"/>
+            </a:solidFill>
+            <a:tailEnd type="triangle"/>
+          </a:ln>
+        </p:spPr>
+        <p:style>
+          <a:lnRef idx="1">
+            <a:schemeClr val="accent1"/>
+          </a:lnRef>
+          <a:fillRef idx="0">
+            <a:schemeClr val="accent1"/>
+          </a:fillRef>
+          <a:effectRef idx="0">
+            <a:schemeClr val="accent1"/>
+          </a:effectRef>
+          <a:fontRef idx="minor">
+            <a:schemeClr val="tx1"/>
+          </a:fontRef>
+        </p:style>
+      </p:cxnSp>
+      <p:sp>
+        <p:nvSpPr>
+          <p:cNvPr id="98" name="Rectangle 97"/>
+          <p:cNvSpPr/>
+          <p:nvPr/>
+        </p:nvSpPr>
+        <p:spPr>
+          <a:xfrm>
+            <a:off x="2362389" y="2046158"/>
+            <a:ext cx="1354975" cy="299962"/>
+          </a:xfrm>
+          <a:prstGeom prst="rect">
+            <a:avLst/>
+          </a:prstGeom>
+          <a:solidFill>
+            <a:schemeClr val="accent1">
+              <a:lumMod val="50000"/>
+            </a:schemeClr>
+          </a:solidFill>
+          <a:ln>
+            <a:solidFill>
+              <a:schemeClr val="bg1"/>
+            </a:solidFill>
+          </a:ln>
+        </p:spPr>
+        <p:style>
+          <a:lnRef idx="2">
+            <a:schemeClr val="accent1">
+              <a:shade val="50000"/>
+            </a:schemeClr>
+          </a:lnRef>
+          <a:fillRef idx="1">
+            <a:schemeClr val="accent1"/>
+          </a:fillRef>
+          <a:effectRef idx="0">
+            <a:schemeClr val="accent1"/>
+          </a:effectRef>
+          <a:fontRef idx="minor">
+            <a:schemeClr val="lt1"/>
+          </a:fontRef>
+        </p:style>
+        <p:txBody>
+          <a:bodyPr rtlCol="0" anchor="ctr"/>
+          <a:lstStyle/>
+          <a:p>
+            <a:pPr algn="ctr"/>
+            <a:r>
+              <a:rPr lang="en-GB" dirty="0" smtClean="0"/>
+              <a:t>Create UI</a:t>
+            </a:r>
+            <a:endParaRPr lang="en-GB" dirty="0"/>
+          </a:p>
+        </p:txBody>
+      </p:sp>
     </p:spTree>
     <p:extLst>
       <p:ext uri="{BB962C8B-B14F-4D97-AF65-F5344CB8AC3E}">

</xml_diff>